<commit_message>
add log A, change to OAEP and add slides
</commit_message>
<xml_diff>
--- a/Cryptanalysis on Asymmetric Ciphers — RSA & RSA.pptx
+++ b/Cryptanalysis on Asymmetric Ciphers — RSA & RSA.pptx
@@ -15,9 +15,12 @@
     <p:sldId id="261" r:id="rId12"/>
     <p:sldId id="262" r:id="rId13"/>
     <p:sldId id="263" r:id="rId14"/>
-    <p:sldId id="264" r:id="rId15"/>
-    <p:sldId id="259" r:id="rId16"/>
-    <p:sldId id="265" r:id="rId17"/>
+    <p:sldId id="270" r:id="rId15"/>
+    <p:sldId id="272" r:id="rId16"/>
+    <p:sldId id="271" r:id="rId17"/>
+    <p:sldId id="264" r:id="rId18"/>
+    <p:sldId id="259" r:id="rId19"/>
+    <p:sldId id="265" r:id="rId20"/>
   </p:sldIdLst>
   <p:sldSz cx="12192000" cy="6858000"/>
   <p:notesSz cx="6858000" cy="9144000"/>
@@ -350,7 +353,7 @@
           <a:p>
             <a:fld id="{E1525300-05E8-4D28-85DB-000DB90F5912}" type="datetimeFigureOut">
               <a:rPr lang="en-US" smtClean="0"/>
-              <a:t>12/24/2025</a:t>
+              <a:t>12/26/2025</a:t>
             </a:fld>
             <a:endParaRPr lang="en-US"/>
           </a:p>
@@ -558,7 +561,7 @@
           <a:p>
             <a:fld id="{E1525300-05E8-4D28-85DB-000DB90F5912}" type="datetimeFigureOut">
               <a:rPr lang="en-US" smtClean="0"/>
-              <a:t>12/24/2025</a:t>
+              <a:t>12/26/2025</a:t>
             </a:fld>
             <a:endParaRPr lang="en-US"/>
           </a:p>
@@ -814,7 +817,7 @@
           <a:p>
             <a:fld id="{E1525300-05E8-4D28-85DB-000DB90F5912}" type="datetimeFigureOut">
               <a:rPr lang="en-US" smtClean="0"/>
-              <a:t>12/24/2025</a:t>
+              <a:t>12/26/2025</a:t>
             </a:fld>
             <a:endParaRPr lang="en-US"/>
           </a:p>
@@ -988,7 +991,7 @@
           <a:p>
             <a:fld id="{E1525300-05E8-4D28-85DB-000DB90F5912}" type="datetimeFigureOut">
               <a:rPr lang="en-US" smtClean="0"/>
-              <a:t>12/24/2025</a:t>
+              <a:t>12/26/2025</a:t>
             </a:fld>
             <a:endParaRPr lang="en-US"/>
           </a:p>
@@ -1331,7 +1334,7 @@
           <a:p>
             <a:fld id="{E1525300-05E8-4D28-85DB-000DB90F5912}" type="datetimeFigureOut">
               <a:rPr lang="en-US" smtClean="0"/>
-              <a:t>12/24/2025</a:t>
+              <a:t>12/26/2025</a:t>
             </a:fld>
             <a:endParaRPr lang="en-US"/>
           </a:p>
@@ -1606,7 +1609,7 @@
           <a:p>
             <a:fld id="{E1525300-05E8-4D28-85DB-000DB90F5912}" type="datetimeFigureOut">
               <a:rPr lang="en-US" smtClean="0"/>
-              <a:t>12/24/2025</a:t>
+              <a:t>12/26/2025</a:t>
             </a:fld>
             <a:endParaRPr lang="en-US"/>
           </a:p>
@@ -1985,7 +1988,7 @@
           <a:p>
             <a:fld id="{E1525300-05E8-4D28-85DB-000DB90F5912}" type="datetimeFigureOut">
               <a:rPr lang="en-US" smtClean="0"/>
-              <a:t>12/24/2025</a:t>
+              <a:t>12/26/2025</a:t>
             </a:fld>
             <a:endParaRPr lang="en-US"/>
           </a:p>
@@ -2103,7 +2106,7 @@
           <a:p>
             <a:fld id="{E1525300-05E8-4D28-85DB-000DB90F5912}" type="datetimeFigureOut">
               <a:rPr lang="en-US" smtClean="0"/>
-              <a:t>12/24/2025</a:t>
+              <a:t>12/26/2025</a:t>
             </a:fld>
             <a:endParaRPr lang="en-US"/>
           </a:p>
@@ -2274,7 +2277,7 @@
           <a:p>
             <a:fld id="{E1525300-05E8-4D28-85DB-000DB90F5912}" type="datetimeFigureOut">
               <a:rPr lang="en-US" smtClean="0"/>
-              <a:t>12/24/2025</a:t>
+              <a:t>12/26/2025</a:t>
             </a:fld>
             <a:endParaRPr lang="en-US"/>
           </a:p>
@@ -2628,7 +2631,7 @@
           <a:p>
             <a:fld id="{E1525300-05E8-4D28-85DB-000DB90F5912}" type="datetimeFigureOut">
               <a:rPr lang="en-US" smtClean="0"/>
-              <a:t>12/24/2025</a:t>
+              <a:t>12/26/2025</a:t>
             </a:fld>
             <a:endParaRPr lang="en-US"/>
           </a:p>
@@ -3010,7 +3013,7 @@
           <a:p>
             <a:fld id="{E1525300-05E8-4D28-85DB-000DB90F5912}" type="datetimeFigureOut">
               <a:rPr lang="en-US" smtClean="0"/>
-              <a:t>12/24/2025</a:t>
+              <a:t>12/26/2025</a:t>
             </a:fld>
             <a:endParaRPr lang="en-US"/>
           </a:p>
@@ -3297,7 +3300,7 @@
           <a:p>
             <a:fld id="{E1525300-05E8-4D28-85DB-000DB90F5912}" type="datetimeFigureOut">
               <a:rPr lang="en-US" smtClean="0"/>
-              <a:t>12/24/2025</a:t>
+              <a:t>12/26/2025</a:t>
             </a:fld>
             <a:endParaRPr lang="en-US"/>
           </a:p>
@@ -3946,7 +3949,1760 @@
               <a:rPr lang="en-US" dirty="0" err="1"/>
               <a:t>quả</a:t>
             </a:r>
-            <a:endParaRPr lang="en-US" dirty="0"/>
+            <a:r>
+              <a:rPr lang="en-US" dirty="0"/>
+              <a:t> - Attack A</a:t>
+            </a:r>
+          </a:p>
+        </p:txBody>
+      </p:sp>
+      <p:graphicFrame>
+        <p:nvGraphicFramePr>
+          <p:cNvPr id="5" name="Table 4">
+            <a:extLst>
+              <a:ext uri="{FF2B5EF4-FFF2-40B4-BE49-F238E27FC236}">
+                <a16:creationId xmlns:a16="http://schemas.microsoft.com/office/drawing/2014/main" id="{9F61B6EB-A329-0870-5659-F3DECF4D066F}"/>
+              </a:ext>
+            </a:extLst>
+          </p:cNvPr>
+          <p:cNvGraphicFramePr>
+            <a:graphicFrameLocks noGrp="1"/>
+          </p:cNvGraphicFramePr>
+          <p:nvPr>
+            <p:extLst>
+              <p:ext uri="{D42A27DB-BD31-4B8C-83A1-F6EECF244321}">
+                <p14:modId xmlns:p14="http://schemas.microsoft.com/office/powerpoint/2010/main" val="2957968570"/>
+              </p:ext>
+            </p:extLst>
+          </p:nvPr>
+        </p:nvGraphicFramePr>
+        <p:xfrm>
+          <a:off x="847592" y="1837396"/>
+          <a:ext cx="10056810" cy="4023206"/>
+        </p:xfrm>
+        <a:graphic>
+          <a:graphicData uri="http://schemas.openxmlformats.org/drawingml/2006/table">
+            <a:tbl>
+              <a:tblPr/>
+              <a:tblGrid>
+                <a:gridCol w="2011362">
+                  <a:extLst>
+                    <a:ext uri="{9D8B030D-6E8A-4147-A177-3AD203B41FA5}">
+                      <a16:colId xmlns:a16="http://schemas.microsoft.com/office/drawing/2014/main" val="1153841641"/>
+                    </a:ext>
+                  </a:extLst>
+                </a:gridCol>
+                <a:gridCol w="2011362">
+                  <a:extLst>
+                    <a:ext uri="{9D8B030D-6E8A-4147-A177-3AD203B41FA5}">
+                      <a16:colId xmlns:a16="http://schemas.microsoft.com/office/drawing/2014/main" val="4206797455"/>
+                    </a:ext>
+                  </a:extLst>
+                </a:gridCol>
+                <a:gridCol w="2011362">
+                  <a:extLst>
+                    <a:ext uri="{9D8B030D-6E8A-4147-A177-3AD203B41FA5}">
+                      <a16:colId xmlns:a16="http://schemas.microsoft.com/office/drawing/2014/main" val="2453286802"/>
+                    </a:ext>
+                  </a:extLst>
+                </a:gridCol>
+                <a:gridCol w="2011362">
+                  <a:extLst>
+                    <a:ext uri="{9D8B030D-6E8A-4147-A177-3AD203B41FA5}">
+                      <a16:colId xmlns:a16="http://schemas.microsoft.com/office/drawing/2014/main" val="1995105878"/>
+                    </a:ext>
+                  </a:extLst>
+                </a:gridCol>
+                <a:gridCol w="2011362">
+                  <a:extLst>
+                    <a:ext uri="{9D8B030D-6E8A-4147-A177-3AD203B41FA5}">
+                      <a16:colId xmlns:a16="http://schemas.microsoft.com/office/drawing/2014/main" val="2954228350"/>
+                    </a:ext>
+                  </a:extLst>
+                </a:gridCol>
+              </a:tblGrid>
+              <a:tr h="365702">
+                <a:tc>
+                  <a:txBody>
+                    <a:bodyPr/>
+                    <a:lstStyle/>
+                    <a:p>
+                      <a:r>
+                        <a:rPr lang="en-US" sz="1800"/>
+                        <a:t>Run</a:t>
+                      </a:r>
+                    </a:p>
+                  </a:txBody>
+                  <a:tcPr marL="91426" marR="91426" marT="45713" marB="45713" anchor="ctr">
+                    <a:lnL>
+                      <a:noFill/>
+                    </a:lnL>
+                    <a:lnR>
+                      <a:noFill/>
+                    </a:lnR>
+                    <a:lnT>
+                      <a:noFill/>
+                    </a:lnT>
+                    <a:lnB>
+                      <a:noFill/>
+                    </a:lnB>
+                    <a:noFill/>
+                  </a:tcPr>
+                </a:tc>
+                <a:tc>
+                  <a:txBody>
+                    <a:bodyPr/>
+                    <a:lstStyle/>
+                    <a:p>
+                      <a:pPr algn="r"/>
+                      <a:r>
+                        <a:rPr lang="en-US" sz="1800"/>
+                        <a:t>Queries</a:t>
+                      </a:r>
+                    </a:p>
+                  </a:txBody>
+                  <a:tcPr marL="91426" marR="91426" marT="45713" marB="45713" anchor="ctr">
+                    <a:lnL>
+                      <a:noFill/>
+                    </a:lnL>
+                    <a:lnR>
+                      <a:noFill/>
+                    </a:lnR>
+                    <a:lnT>
+                      <a:noFill/>
+                    </a:lnT>
+                    <a:lnB>
+                      <a:noFill/>
+                    </a:lnB>
+                    <a:noFill/>
+                  </a:tcPr>
+                </a:tc>
+                <a:tc>
+                  <a:txBody>
+                    <a:bodyPr/>
+                    <a:lstStyle/>
+                    <a:p>
+                      <a:pPr algn="r"/>
+                      <a:r>
+                        <a:rPr lang="en-US" sz="1800"/>
+                        <a:t>Time (s)</a:t>
+                      </a:r>
+                    </a:p>
+                  </a:txBody>
+                  <a:tcPr marL="91426" marR="91426" marT="45713" marB="45713" anchor="ctr">
+                    <a:lnL>
+                      <a:noFill/>
+                    </a:lnL>
+                    <a:lnR>
+                      <a:noFill/>
+                    </a:lnR>
+                    <a:lnT>
+                      <a:noFill/>
+                    </a:lnT>
+                    <a:lnB>
+                      <a:noFill/>
+                    </a:lnB>
+                    <a:noFill/>
+                  </a:tcPr>
+                </a:tc>
+                <a:tc>
+                  <a:txBody>
+                    <a:bodyPr/>
+                    <a:lstStyle/>
+                    <a:p>
+                      <a:pPr algn="r"/>
+                      <a:r>
+                        <a:rPr lang="en-US" sz="1800"/>
+                        <a:t>Avg / query (s)</a:t>
+                      </a:r>
+                    </a:p>
+                  </a:txBody>
+                  <a:tcPr marL="91426" marR="91426" marT="45713" marB="45713" anchor="ctr">
+                    <a:lnL>
+                      <a:noFill/>
+                    </a:lnL>
+                    <a:lnR>
+                      <a:noFill/>
+                    </a:lnR>
+                    <a:lnT>
+                      <a:noFill/>
+                    </a:lnT>
+                    <a:lnB>
+                      <a:noFill/>
+                    </a:lnB>
+                    <a:noFill/>
+                  </a:tcPr>
+                </a:tc>
+                <a:tc>
+                  <a:txBody>
+                    <a:bodyPr/>
+                    <a:lstStyle/>
+                    <a:p>
+                      <a:pPr algn="r"/>
+                      <a:r>
+                        <a:rPr lang="en-US" sz="1800" dirty="0"/>
+                        <a:t>QPS</a:t>
+                      </a:r>
+                    </a:p>
+                  </a:txBody>
+                  <a:tcPr marL="91426" marR="91426" marT="45713" marB="45713" anchor="ctr">
+                    <a:lnL>
+                      <a:noFill/>
+                    </a:lnL>
+                    <a:lnR>
+                      <a:noFill/>
+                    </a:lnR>
+                    <a:lnT>
+                      <a:noFill/>
+                    </a:lnT>
+                    <a:lnB>
+                      <a:noFill/>
+                    </a:lnB>
+                    <a:noFill/>
+                  </a:tcPr>
+                </a:tc>
+                <a:extLst>
+                  <a:ext uri="{0D108BD9-81ED-4DB2-BD59-A6C34878D82A}">
+                    <a16:rowId xmlns:a16="http://schemas.microsoft.com/office/drawing/2014/main" val="3319889057"/>
+                  </a:ext>
+                </a:extLst>
+              </a:tr>
+              <a:tr h="365702">
+                <a:tc>
+                  <a:txBody>
+                    <a:bodyPr/>
+                    <a:lstStyle/>
+                    <a:p>
+                      <a:r>
+                        <a:rPr lang="en-US" sz="1800" dirty="0"/>
+                        <a:t>1</a:t>
+                      </a:r>
+                    </a:p>
+                  </a:txBody>
+                  <a:tcPr marL="91426" marR="91426" marT="45713" marB="45713" anchor="ctr">
+                    <a:lnL>
+                      <a:noFill/>
+                    </a:lnL>
+                    <a:lnR>
+                      <a:noFill/>
+                    </a:lnR>
+                    <a:lnT>
+                      <a:noFill/>
+                    </a:lnT>
+                    <a:lnB>
+                      <a:noFill/>
+                    </a:lnB>
+                    <a:noFill/>
+                  </a:tcPr>
+                </a:tc>
+                <a:tc>
+                  <a:txBody>
+                    <a:bodyPr/>
+                    <a:lstStyle/>
+                    <a:p>
+                      <a:pPr algn="r"/>
+                      <a:r>
+                        <a:rPr lang="en-US" sz="1800"/>
+                        <a:t>183,346</a:t>
+                      </a:r>
+                    </a:p>
+                  </a:txBody>
+                  <a:tcPr marL="91426" marR="91426" marT="45713" marB="45713" anchor="ctr">
+                    <a:lnL>
+                      <a:noFill/>
+                    </a:lnL>
+                    <a:lnR>
+                      <a:noFill/>
+                    </a:lnR>
+                    <a:lnT>
+                      <a:noFill/>
+                    </a:lnT>
+                    <a:lnB>
+                      <a:noFill/>
+                    </a:lnB>
+                    <a:noFill/>
+                  </a:tcPr>
+                </a:tc>
+                <a:tc>
+                  <a:txBody>
+                    <a:bodyPr/>
+                    <a:lstStyle/>
+                    <a:p>
+                      <a:pPr algn="r"/>
+                      <a:r>
+                        <a:rPr lang="en-US" sz="1800"/>
+                        <a:t>360.38</a:t>
+                      </a:r>
+                    </a:p>
+                  </a:txBody>
+                  <a:tcPr marL="91426" marR="91426" marT="45713" marB="45713" anchor="ctr">
+                    <a:lnL>
+                      <a:noFill/>
+                    </a:lnL>
+                    <a:lnR>
+                      <a:noFill/>
+                    </a:lnR>
+                    <a:lnT>
+                      <a:noFill/>
+                    </a:lnT>
+                    <a:lnB>
+                      <a:noFill/>
+                    </a:lnB>
+                    <a:noFill/>
+                  </a:tcPr>
+                </a:tc>
+                <a:tc>
+                  <a:txBody>
+                    <a:bodyPr/>
+                    <a:lstStyle/>
+                    <a:p>
+                      <a:pPr algn="r"/>
+                      <a:r>
+                        <a:rPr lang="en-US" sz="1800"/>
+                        <a:t>0.001966</a:t>
+                      </a:r>
+                    </a:p>
+                  </a:txBody>
+                  <a:tcPr marL="91426" marR="91426" marT="45713" marB="45713" anchor="ctr">
+                    <a:lnL>
+                      <a:noFill/>
+                    </a:lnL>
+                    <a:lnR>
+                      <a:noFill/>
+                    </a:lnR>
+                    <a:lnT>
+                      <a:noFill/>
+                    </a:lnT>
+                    <a:lnB>
+                      <a:noFill/>
+                    </a:lnB>
+                    <a:noFill/>
+                  </a:tcPr>
+                </a:tc>
+                <a:tc>
+                  <a:txBody>
+                    <a:bodyPr/>
+                    <a:lstStyle/>
+                    <a:p>
+                      <a:pPr algn="r"/>
+                      <a:r>
+                        <a:rPr lang="en-US" sz="1800"/>
+                        <a:t>508.76</a:t>
+                      </a:r>
+                    </a:p>
+                  </a:txBody>
+                  <a:tcPr marL="91426" marR="91426" marT="45713" marB="45713" anchor="ctr">
+                    <a:lnL>
+                      <a:noFill/>
+                    </a:lnL>
+                    <a:lnR>
+                      <a:noFill/>
+                    </a:lnR>
+                    <a:lnT>
+                      <a:noFill/>
+                    </a:lnT>
+                    <a:lnB>
+                      <a:noFill/>
+                    </a:lnB>
+                    <a:noFill/>
+                  </a:tcPr>
+                </a:tc>
+                <a:extLst>
+                  <a:ext uri="{0D108BD9-81ED-4DB2-BD59-A6C34878D82A}">
+                    <a16:rowId xmlns:a16="http://schemas.microsoft.com/office/drawing/2014/main" val="2324757432"/>
+                  </a:ext>
+                </a:extLst>
+              </a:tr>
+              <a:tr h="365702">
+                <a:tc>
+                  <a:txBody>
+                    <a:bodyPr/>
+                    <a:lstStyle/>
+                    <a:p>
+                      <a:r>
+                        <a:rPr lang="en-US" sz="1800"/>
+                        <a:t>2</a:t>
+                      </a:r>
+                    </a:p>
+                  </a:txBody>
+                  <a:tcPr marL="91426" marR="91426" marT="45713" marB="45713" anchor="ctr">
+                    <a:lnL>
+                      <a:noFill/>
+                    </a:lnL>
+                    <a:lnR>
+                      <a:noFill/>
+                    </a:lnR>
+                    <a:lnT>
+                      <a:noFill/>
+                    </a:lnT>
+                    <a:lnB>
+                      <a:noFill/>
+                    </a:lnB>
+                    <a:noFill/>
+                  </a:tcPr>
+                </a:tc>
+                <a:tc>
+                  <a:txBody>
+                    <a:bodyPr/>
+                    <a:lstStyle/>
+                    <a:p>
+                      <a:pPr algn="r"/>
+                      <a:r>
+                        <a:rPr lang="en-US" sz="1800"/>
+                        <a:t>194,874</a:t>
+                      </a:r>
+                    </a:p>
+                  </a:txBody>
+                  <a:tcPr marL="91426" marR="91426" marT="45713" marB="45713" anchor="ctr">
+                    <a:lnL>
+                      <a:noFill/>
+                    </a:lnL>
+                    <a:lnR>
+                      <a:noFill/>
+                    </a:lnR>
+                    <a:lnT>
+                      <a:noFill/>
+                    </a:lnT>
+                    <a:lnB>
+                      <a:noFill/>
+                    </a:lnB>
+                    <a:noFill/>
+                  </a:tcPr>
+                </a:tc>
+                <a:tc>
+                  <a:txBody>
+                    <a:bodyPr/>
+                    <a:lstStyle/>
+                    <a:p>
+                      <a:pPr algn="r"/>
+                      <a:r>
+                        <a:rPr lang="en-US" sz="1800"/>
+                        <a:t>381.57</a:t>
+                      </a:r>
+                    </a:p>
+                  </a:txBody>
+                  <a:tcPr marL="91426" marR="91426" marT="45713" marB="45713" anchor="ctr">
+                    <a:lnL>
+                      <a:noFill/>
+                    </a:lnL>
+                    <a:lnR>
+                      <a:noFill/>
+                    </a:lnR>
+                    <a:lnT>
+                      <a:noFill/>
+                    </a:lnT>
+                    <a:lnB>
+                      <a:noFill/>
+                    </a:lnB>
+                    <a:noFill/>
+                  </a:tcPr>
+                </a:tc>
+                <a:tc>
+                  <a:txBody>
+                    <a:bodyPr/>
+                    <a:lstStyle/>
+                    <a:p>
+                      <a:pPr algn="r"/>
+                      <a:r>
+                        <a:rPr lang="en-US" sz="1800"/>
+                        <a:t>0.001958</a:t>
+                      </a:r>
+                    </a:p>
+                  </a:txBody>
+                  <a:tcPr marL="91426" marR="91426" marT="45713" marB="45713" anchor="ctr">
+                    <a:lnL>
+                      <a:noFill/>
+                    </a:lnL>
+                    <a:lnR>
+                      <a:noFill/>
+                    </a:lnR>
+                    <a:lnT>
+                      <a:noFill/>
+                    </a:lnT>
+                    <a:lnB>
+                      <a:noFill/>
+                    </a:lnB>
+                    <a:noFill/>
+                  </a:tcPr>
+                </a:tc>
+                <a:tc>
+                  <a:txBody>
+                    <a:bodyPr/>
+                    <a:lstStyle/>
+                    <a:p>
+                      <a:pPr algn="r"/>
+                      <a:r>
+                        <a:rPr lang="en-US" sz="1800"/>
+                        <a:t>510.72</a:t>
+                      </a:r>
+                    </a:p>
+                  </a:txBody>
+                  <a:tcPr marL="91426" marR="91426" marT="45713" marB="45713" anchor="ctr">
+                    <a:lnL>
+                      <a:noFill/>
+                    </a:lnL>
+                    <a:lnR>
+                      <a:noFill/>
+                    </a:lnR>
+                    <a:lnT>
+                      <a:noFill/>
+                    </a:lnT>
+                    <a:lnB>
+                      <a:noFill/>
+                    </a:lnB>
+                    <a:noFill/>
+                  </a:tcPr>
+                </a:tc>
+                <a:extLst>
+                  <a:ext uri="{0D108BD9-81ED-4DB2-BD59-A6C34878D82A}">
+                    <a16:rowId xmlns:a16="http://schemas.microsoft.com/office/drawing/2014/main" val="3830206877"/>
+                  </a:ext>
+                </a:extLst>
+              </a:tr>
+              <a:tr h="365702">
+                <a:tc>
+                  <a:txBody>
+                    <a:bodyPr/>
+                    <a:lstStyle/>
+                    <a:p>
+                      <a:r>
+                        <a:rPr lang="en-US" sz="1800"/>
+                        <a:t>3</a:t>
+                      </a:r>
+                    </a:p>
+                  </a:txBody>
+                  <a:tcPr marL="91426" marR="91426" marT="45713" marB="45713" anchor="ctr">
+                    <a:lnL>
+                      <a:noFill/>
+                    </a:lnL>
+                    <a:lnR>
+                      <a:noFill/>
+                    </a:lnR>
+                    <a:lnT>
+                      <a:noFill/>
+                    </a:lnT>
+                    <a:lnB>
+                      <a:noFill/>
+                    </a:lnB>
+                    <a:noFill/>
+                  </a:tcPr>
+                </a:tc>
+                <a:tc>
+                  <a:txBody>
+                    <a:bodyPr/>
+                    <a:lstStyle/>
+                    <a:p>
+                      <a:pPr algn="r"/>
+                      <a:r>
+                        <a:rPr lang="en-US" sz="1800"/>
+                        <a:t>298,513</a:t>
+                      </a:r>
+                    </a:p>
+                  </a:txBody>
+                  <a:tcPr marL="91426" marR="91426" marT="45713" marB="45713" anchor="ctr">
+                    <a:lnL>
+                      <a:noFill/>
+                    </a:lnL>
+                    <a:lnR>
+                      <a:noFill/>
+                    </a:lnR>
+                    <a:lnT>
+                      <a:noFill/>
+                    </a:lnT>
+                    <a:lnB>
+                      <a:noFill/>
+                    </a:lnB>
+                    <a:noFill/>
+                  </a:tcPr>
+                </a:tc>
+                <a:tc>
+                  <a:txBody>
+                    <a:bodyPr/>
+                    <a:lstStyle/>
+                    <a:p>
+                      <a:pPr algn="r"/>
+                      <a:r>
+                        <a:rPr lang="en-US" sz="1800"/>
+                        <a:t>576.78</a:t>
+                      </a:r>
+                    </a:p>
+                  </a:txBody>
+                  <a:tcPr marL="91426" marR="91426" marT="45713" marB="45713" anchor="ctr">
+                    <a:lnL>
+                      <a:noFill/>
+                    </a:lnL>
+                    <a:lnR>
+                      <a:noFill/>
+                    </a:lnR>
+                    <a:lnT>
+                      <a:noFill/>
+                    </a:lnT>
+                    <a:lnB>
+                      <a:noFill/>
+                    </a:lnB>
+                    <a:noFill/>
+                  </a:tcPr>
+                </a:tc>
+                <a:tc>
+                  <a:txBody>
+                    <a:bodyPr/>
+                    <a:lstStyle/>
+                    <a:p>
+                      <a:pPr algn="r"/>
+                      <a:r>
+                        <a:rPr lang="en-US" sz="1800"/>
+                        <a:t>0.001932</a:t>
+                      </a:r>
+                    </a:p>
+                  </a:txBody>
+                  <a:tcPr marL="91426" marR="91426" marT="45713" marB="45713" anchor="ctr">
+                    <a:lnL>
+                      <a:noFill/>
+                    </a:lnL>
+                    <a:lnR>
+                      <a:noFill/>
+                    </a:lnR>
+                    <a:lnT>
+                      <a:noFill/>
+                    </a:lnT>
+                    <a:lnB>
+                      <a:noFill/>
+                    </a:lnB>
+                    <a:noFill/>
+                  </a:tcPr>
+                </a:tc>
+                <a:tc>
+                  <a:txBody>
+                    <a:bodyPr/>
+                    <a:lstStyle/>
+                    <a:p>
+                      <a:pPr algn="r"/>
+                      <a:r>
+                        <a:rPr lang="en-US" sz="1800"/>
+                        <a:t>517.55</a:t>
+                      </a:r>
+                    </a:p>
+                  </a:txBody>
+                  <a:tcPr marL="91426" marR="91426" marT="45713" marB="45713" anchor="ctr">
+                    <a:lnL>
+                      <a:noFill/>
+                    </a:lnL>
+                    <a:lnR>
+                      <a:noFill/>
+                    </a:lnR>
+                    <a:lnT>
+                      <a:noFill/>
+                    </a:lnT>
+                    <a:lnB>
+                      <a:noFill/>
+                    </a:lnB>
+                    <a:noFill/>
+                  </a:tcPr>
+                </a:tc>
+                <a:extLst>
+                  <a:ext uri="{0D108BD9-81ED-4DB2-BD59-A6C34878D82A}">
+                    <a16:rowId xmlns:a16="http://schemas.microsoft.com/office/drawing/2014/main" val="474270124"/>
+                  </a:ext>
+                </a:extLst>
+              </a:tr>
+              <a:tr h="365702">
+                <a:tc>
+                  <a:txBody>
+                    <a:bodyPr/>
+                    <a:lstStyle/>
+                    <a:p>
+                      <a:r>
+                        <a:rPr lang="en-US" sz="1800" dirty="0"/>
+                        <a:t>4</a:t>
+                      </a:r>
+                    </a:p>
+                  </a:txBody>
+                  <a:tcPr marL="91426" marR="91426" marT="45713" marB="45713" anchor="ctr">
+                    <a:lnL>
+                      <a:noFill/>
+                    </a:lnL>
+                    <a:lnR>
+                      <a:noFill/>
+                    </a:lnR>
+                    <a:lnT>
+                      <a:noFill/>
+                    </a:lnT>
+                    <a:lnB>
+                      <a:noFill/>
+                    </a:lnB>
+                    <a:noFill/>
+                  </a:tcPr>
+                </a:tc>
+                <a:tc>
+                  <a:txBody>
+                    <a:bodyPr/>
+                    <a:lstStyle/>
+                    <a:p>
+                      <a:pPr algn="r"/>
+                      <a:r>
+                        <a:rPr lang="en-US" sz="1800"/>
+                        <a:t>53,511</a:t>
+                      </a:r>
+                    </a:p>
+                  </a:txBody>
+                  <a:tcPr marL="91426" marR="91426" marT="45713" marB="45713" anchor="ctr">
+                    <a:lnL>
+                      <a:noFill/>
+                    </a:lnL>
+                    <a:lnR>
+                      <a:noFill/>
+                    </a:lnR>
+                    <a:lnT>
+                      <a:noFill/>
+                    </a:lnT>
+                    <a:lnB>
+                      <a:noFill/>
+                    </a:lnB>
+                    <a:noFill/>
+                  </a:tcPr>
+                </a:tc>
+                <a:tc>
+                  <a:txBody>
+                    <a:bodyPr/>
+                    <a:lstStyle/>
+                    <a:p>
+                      <a:pPr algn="r"/>
+                      <a:r>
+                        <a:rPr lang="en-US" sz="1800"/>
+                        <a:t>107.14</a:t>
+                      </a:r>
+                    </a:p>
+                  </a:txBody>
+                  <a:tcPr marL="91426" marR="91426" marT="45713" marB="45713" anchor="ctr">
+                    <a:lnL>
+                      <a:noFill/>
+                    </a:lnL>
+                    <a:lnR>
+                      <a:noFill/>
+                    </a:lnR>
+                    <a:lnT>
+                      <a:noFill/>
+                    </a:lnT>
+                    <a:lnB>
+                      <a:noFill/>
+                    </a:lnB>
+                    <a:noFill/>
+                  </a:tcPr>
+                </a:tc>
+                <a:tc>
+                  <a:txBody>
+                    <a:bodyPr/>
+                    <a:lstStyle/>
+                    <a:p>
+                      <a:pPr algn="r"/>
+                      <a:r>
+                        <a:rPr lang="en-US" sz="1800"/>
+                        <a:t>0.002002</a:t>
+                      </a:r>
+                    </a:p>
+                  </a:txBody>
+                  <a:tcPr marL="91426" marR="91426" marT="45713" marB="45713" anchor="ctr">
+                    <a:lnL>
+                      <a:noFill/>
+                    </a:lnL>
+                    <a:lnR>
+                      <a:noFill/>
+                    </a:lnR>
+                    <a:lnT>
+                      <a:noFill/>
+                    </a:lnT>
+                    <a:lnB>
+                      <a:noFill/>
+                    </a:lnB>
+                    <a:noFill/>
+                  </a:tcPr>
+                </a:tc>
+                <a:tc>
+                  <a:txBody>
+                    <a:bodyPr/>
+                    <a:lstStyle/>
+                    <a:p>
+                      <a:pPr algn="r"/>
+                      <a:r>
+                        <a:rPr lang="en-US" sz="1800"/>
+                        <a:t>499.44</a:t>
+                      </a:r>
+                    </a:p>
+                  </a:txBody>
+                  <a:tcPr marL="91426" marR="91426" marT="45713" marB="45713" anchor="ctr">
+                    <a:lnL>
+                      <a:noFill/>
+                    </a:lnL>
+                    <a:lnR>
+                      <a:noFill/>
+                    </a:lnR>
+                    <a:lnT>
+                      <a:noFill/>
+                    </a:lnT>
+                    <a:lnB>
+                      <a:noFill/>
+                    </a:lnB>
+                    <a:noFill/>
+                  </a:tcPr>
+                </a:tc>
+                <a:extLst>
+                  <a:ext uri="{0D108BD9-81ED-4DB2-BD59-A6C34878D82A}">
+                    <a16:rowId xmlns:a16="http://schemas.microsoft.com/office/drawing/2014/main" val="1991528959"/>
+                  </a:ext>
+                </a:extLst>
+              </a:tr>
+              <a:tr h="365702">
+                <a:tc>
+                  <a:txBody>
+                    <a:bodyPr/>
+                    <a:lstStyle/>
+                    <a:p>
+                      <a:r>
+                        <a:rPr lang="en-US" sz="1800"/>
+                        <a:t>5</a:t>
+                      </a:r>
+                    </a:p>
+                  </a:txBody>
+                  <a:tcPr marL="91426" marR="91426" marT="45713" marB="45713" anchor="ctr">
+                    <a:lnL>
+                      <a:noFill/>
+                    </a:lnL>
+                    <a:lnR>
+                      <a:noFill/>
+                    </a:lnR>
+                    <a:lnT>
+                      <a:noFill/>
+                    </a:lnT>
+                    <a:lnB>
+                      <a:noFill/>
+                    </a:lnB>
+                    <a:noFill/>
+                  </a:tcPr>
+                </a:tc>
+                <a:tc>
+                  <a:txBody>
+                    <a:bodyPr/>
+                    <a:lstStyle/>
+                    <a:p>
+                      <a:pPr algn="r"/>
+                      <a:r>
+                        <a:rPr lang="en-US" sz="1800"/>
+                        <a:t>46,068</a:t>
+                      </a:r>
+                    </a:p>
+                  </a:txBody>
+                  <a:tcPr marL="91426" marR="91426" marT="45713" marB="45713" anchor="ctr">
+                    <a:lnL>
+                      <a:noFill/>
+                    </a:lnL>
+                    <a:lnR>
+                      <a:noFill/>
+                    </a:lnR>
+                    <a:lnT>
+                      <a:noFill/>
+                    </a:lnT>
+                    <a:lnB>
+                      <a:noFill/>
+                    </a:lnB>
+                    <a:noFill/>
+                  </a:tcPr>
+                </a:tc>
+                <a:tc>
+                  <a:txBody>
+                    <a:bodyPr/>
+                    <a:lstStyle/>
+                    <a:p>
+                      <a:pPr algn="r"/>
+                      <a:r>
+                        <a:rPr lang="en-US" sz="1800"/>
+                        <a:t>101.14</a:t>
+                      </a:r>
+                    </a:p>
+                  </a:txBody>
+                  <a:tcPr marL="91426" marR="91426" marT="45713" marB="45713" anchor="ctr">
+                    <a:lnL>
+                      <a:noFill/>
+                    </a:lnL>
+                    <a:lnR>
+                      <a:noFill/>
+                    </a:lnR>
+                    <a:lnT>
+                      <a:noFill/>
+                    </a:lnT>
+                    <a:lnB>
+                      <a:noFill/>
+                    </a:lnB>
+                    <a:noFill/>
+                  </a:tcPr>
+                </a:tc>
+                <a:tc>
+                  <a:txBody>
+                    <a:bodyPr/>
+                    <a:lstStyle/>
+                    <a:p>
+                      <a:pPr algn="r"/>
+                      <a:r>
+                        <a:rPr lang="en-US" sz="1800"/>
+                        <a:t>0.002195</a:t>
+                      </a:r>
+                    </a:p>
+                  </a:txBody>
+                  <a:tcPr marL="91426" marR="91426" marT="45713" marB="45713" anchor="ctr">
+                    <a:lnL>
+                      <a:noFill/>
+                    </a:lnL>
+                    <a:lnR>
+                      <a:noFill/>
+                    </a:lnR>
+                    <a:lnT>
+                      <a:noFill/>
+                    </a:lnT>
+                    <a:lnB>
+                      <a:noFill/>
+                    </a:lnB>
+                    <a:noFill/>
+                  </a:tcPr>
+                </a:tc>
+                <a:tc>
+                  <a:txBody>
+                    <a:bodyPr/>
+                    <a:lstStyle/>
+                    <a:p>
+                      <a:pPr algn="r"/>
+                      <a:r>
+                        <a:rPr lang="en-US" sz="1800"/>
+                        <a:t>455.51</a:t>
+                      </a:r>
+                    </a:p>
+                  </a:txBody>
+                  <a:tcPr marL="91426" marR="91426" marT="45713" marB="45713" anchor="ctr">
+                    <a:lnL>
+                      <a:noFill/>
+                    </a:lnL>
+                    <a:lnR>
+                      <a:noFill/>
+                    </a:lnR>
+                    <a:lnT>
+                      <a:noFill/>
+                    </a:lnT>
+                    <a:lnB>
+                      <a:noFill/>
+                    </a:lnB>
+                    <a:noFill/>
+                  </a:tcPr>
+                </a:tc>
+                <a:extLst>
+                  <a:ext uri="{0D108BD9-81ED-4DB2-BD59-A6C34878D82A}">
+                    <a16:rowId xmlns:a16="http://schemas.microsoft.com/office/drawing/2014/main" val="593268828"/>
+                  </a:ext>
+                </a:extLst>
+              </a:tr>
+              <a:tr h="365702">
+                <a:tc>
+                  <a:txBody>
+                    <a:bodyPr/>
+                    <a:lstStyle/>
+                    <a:p>
+                      <a:r>
+                        <a:rPr lang="en-US" sz="1800"/>
+                        <a:t>6</a:t>
+                      </a:r>
+                    </a:p>
+                  </a:txBody>
+                  <a:tcPr marL="91426" marR="91426" marT="45713" marB="45713" anchor="ctr">
+                    <a:lnL>
+                      <a:noFill/>
+                    </a:lnL>
+                    <a:lnR>
+                      <a:noFill/>
+                    </a:lnR>
+                    <a:lnT>
+                      <a:noFill/>
+                    </a:lnT>
+                    <a:lnB>
+                      <a:noFill/>
+                    </a:lnB>
+                    <a:noFill/>
+                  </a:tcPr>
+                </a:tc>
+                <a:tc>
+                  <a:txBody>
+                    <a:bodyPr/>
+                    <a:lstStyle/>
+                    <a:p>
+                      <a:pPr algn="r"/>
+                      <a:r>
+                        <a:rPr lang="en-US" sz="1800"/>
+                        <a:t>366,681</a:t>
+                      </a:r>
+                    </a:p>
+                  </a:txBody>
+                  <a:tcPr marL="91426" marR="91426" marT="45713" marB="45713" anchor="ctr">
+                    <a:lnL>
+                      <a:noFill/>
+                    </a:lnL>
+                    <a:lnR>
+                      <a:noFill/>
+                    </a:lnR>
+                    <a:lnT>
+                      <a:noFill/>
+                    </a:lnT>
+                    <a:lnB>
+                      <a:noFill/>
+                    </a:lnB>
+                    <a:noFill/>
+                  </a:tcPr>
+                </a:tc>
+                <a:tc>
+                  <a:txBody>
+                    <a:bodyPr/>
+                    <a:lstStyle/>
+                    <a:p>
+                      <a:pPr algn="r"/>
+                      <a:r>
+                        <a:rPr lang="en-US" sz="1800"/>
+                        <a:t>709.11</a:t>
+                      </a:r>
+                    </a:p>
+                  </a:txBody>
+                  <a:tcPr marL="91426" marR="91426" marT="45713" marB="45713" anchor="ctr">
+                    <a:lnL>
+                      <a:noFill/>
+                    </a:lnL>
+                    <a:lnR>
+                      <a:noFill/>
+                    </a:lnR>
+                    <a:lnT>
+                      <a:noFill/>
+                    </a:lnT>
+                    <a:lnB>
+                      <a:noFill/>
+                    </a:lnB>
+                    <a:noFill/>
+                  </a:tcPr>
+                </a:tc>
+                <a:tc>
+                  <a:txBody>
+                    <a:bodyPr/>
+                    <a:lstStyle/>
+                    <a:p>
+                      <a:pPr algn="r"/>
+                      <a:r>
+                        <a:rPr lang="en-US" sz="1800"/>
+                        <a:t>0.001934</a:t>
+                      </a:r>
+                    </a:p>
+                  </a:txBody>
+                  <a:tcPr marL="91426" marR="91426" marT="45713" marB="45713" anchor="ctr">
+                    <a:lnL>
+                      <a:noFill/>
+                    </a:lnL>
+                    <a:lnR>
+                      <a:noFill/>
+                    </a:lnR>
+                    <a:lnT>
+                      <a:noFill/>
+                    </a:lnT>
+                    <a:lnB>
+                      <a:noFill/>
+                    </a:lnB>
+                    <a:noFill/>
+                  </a:tcPr>
+                </a:tc>
+                <a:tc>
+                  <a:txBody>
+                    <a:bodyPr/>
+                    <a:lstStyle/>
+                    <a:p>
+                      <a:pPr algn="r"/>
+                      <a:r>
+                        <a:rPr lang="en-US" sz="1800"/>
+                        <a:t>517.10</a:t>
+                      </a:r>
+                    </a:p>
+                  </a:txBody>
+                  <a:tcPr marL="91426" marR="91426" marT="45713" marB="45713" anchor="ctr">
+                    <a:lnL>
+                      <a:noFill/>
+                    </a:lnL>
+                    <a:lnR>
+                      <a:noFill/>
+                    </a:lnR>
+                    <a:lnT>
+                      <a:noFill/>
+                    </a:lnT>
+                    <a:lnB>
+                      <a:noFill/>
+                    </a:lnB>
+                    <a:noFill/>
+                  </a:tcPr>
+                </a:tc>
+                <a:extLst>
+                  <a:ext uri="{0D108BD9-81ED-4DB2-BD59-A6C34878D82A}">
+                    <a16:rowId xmlns:a16="http://schemas.microsoft.com/office/drawing/2014/main" val="3881476309"/>
+                  </a:ext>
+                </a:extLst>
+              </a:tr>
+              <a:tr h="365702">
+                <a:tc>
+                  <a:txBody>
+                    <a:bodyPr/>
+                    <a:lstStyle/>
+                    <a:p>
+                      <a:r>
+                        <a:rPr lang="en-US" sz="1800"/>
+                        <a:t>7</a:t>
+                      </a:r>
+                    </a:p>
+                  </a:txBody>
+                  <a:tcPr marL="91426" marR="91426" marT="45713" marB="45713" anchor="ctr">
+                    <a:lnL>
+                      <a:noFill/>
+                    </a:lnL>
+                    <a:lnR>
+                      <a:noFill/>
+                    </a:lnR>
+                    <a:lnT>
+                      <a:noFill/>
+                    </a:lnT>
+                    <a:lnB>
+                      <a:noFill/>
+                    </a:lnB>
+                    <a:noFill/>
+                  </a:tcPr>
+                </a:tc>
+                <a:tc>
+                  <a:txBody>
+                    <a:bodyPr/>
+                    <a:lstStyle/>
+                    <a:p>
+                      <a:pPr algn="r"/>
+                      <a:r>
+                        <a:rPr lang="en-US" sz="1800"/>
+                        <a:t>582,094</a:t>
+                      </a:r>
+                    </a:p>
+                  </a:txBody>
+                  <a:tcPr marL="91426" marR="91426" marT="45713" marB="45713" anchor="ctr">
+                    <a:lnL>
+                      <a:noFill/>
+                    </a:lnL>
+                    <a:lnR>
+                      <a:noFill/>
+                    </a:lnR>
+                    <a:lnT>
+                      <a:noFill/>
+                    </a:lnT>
+                    <a:lnB>
+                      <a:noFill/>
+                    </a:lnB>
+                    <a:noFill/>
+                  </a:tcPr>
+                </a:tc>
+                <a:tc>
+                  <a:txBody>
+                    <a:bodyPr/>
+                    <a:lstStyle/>
+                    <a:p>
+                      <a:pPr algn="r"/>
+                      <a:r>
+                        <a:rPr lang="en-US" sz="1800"/>
+                        <a:t>1152.26</a:t>
+                      </a:r>
+                    </a:p>
+                  </a:txBody>
+                  <a:tcPr marL="91426" marR="91426" marT="45713" marB="45713" anchor="ctr">
+                    <a:lnL>
+                      <a:noFill/>
+                    </a:lnL>
+                    <a:lnR>
+                      <a:noFill/>
+                    </a:lnR>
+                    <a:lnT>
+                      <a:noFill/>
+                    </a:lnT>
+                    <a:lnB>
+                      <a:noFill/>
+                    </a:lnB>
+                    <a:noFill/>
+                  </a:tcPr>
+                </a:tc>
+                <a:tc>
+                  <a:txBody>
+                    <a:bodyPr/>
+                    <a:lstStyle/>
+                    <a:p>
+                      <a:pPr algn="r"/>
+                      <a:r>
+                        <a:rPr lang="en-US" sz="1800"/>
+                        <a:t>0.001980</a:t>
+                      </a:r>
+                    </a:p>
+                  </a:txBody>
+                  <a:tcPr marL="91426" marR="91426" marT="45713" marB="45713" anchor="ctr">
+                    <a:lnL>
+                      <a:noFill/>
+                    </a:lnL>
+                    <a:lnR>
+                      <a:noFill/>
+                    </a:lnR>
+                    <a:lnT>
+                      <a:noFill/>
+                    </a:lnT>
+                    <a:lnB>
+                      <a:noFill/>
+                    </a:lnB>
+                    <a:noFill/>
+                  </a:tcPr>
+                </a:tc>
+                <a:tc>
+                  <a:txBody>
+                    <a:bodyPr/>
+                    <a:lstStyle/>
+                    <a:p>
+                      <a:pPr algn="r"/>
+                      <a:r>
+                        <a:rPr lang="en-US" sz="1800"/>
+                        <a:t>505.18</a:t>
+                      </a:r>
+                    </a:p>
+                  </a:txBody>
+                  <a:tcPr marL="91426" marR="91426" marT="45713" marB="45713" anchor="ctr">
+                    <a:lnL>
+                      <a:noFill/>
+                    </a:lnL>
+                    <a:lnR>
+                      <a:noFill/>
+                    </a:lnR>
+                    <a:lnT>
+                      <a:noFill/>
+                    </a:lnT>
+                    <a:lnB>
+                      <a:noFill/>
+                    </a:lnB>
+                    <a:noFill/>
+                  </a:tcPr>
+                </a:tc>
+                <a:extLst>
+                  <a:ext uri="{0D108BD9-81ED-4DB2-BD59-A6C34878D82A}">
+                    <a16:rowId xmlns:a16="http://schemas.microsoft.com/office/drawing/2014/main" val="369069557"/>
+                  </a:ext>
+                </a:extLst>
+              </a:tr>
+              <a:tr h="365702">
+                <a:tc>
+                  <a:txBody>
+                    <a:bodyPr/>
+                    <a:lstStyle/>
+                    <a:p>
+                      <a:r>
+                        <a:rPr lang="en-US" sz="1800"/>
+                        <a:t>8</a:t>
+                      </a:r>
+                    </a:p>
+                  </a:txBody>
+                  <a:tcPr marL="91426" marR="91426" marT="45713" marB="45713" anchor="ctr">
+                    <a:lnL>
+                      <a:noFill/>
+                    </a:lnL>
+                    <a:lnR>
+                      <a:noFill/>
+                    </a:lnR>
+                    <a:lnT>
+                      <a:noFill/>
+                    </a:lnT>
+                    <a:lnB>
+                      <a:noFill/>
+                    </a:lnB>
+                    <a:noFill/>
+                  </a:tcPr>
+                </a:tc>
+                <a:tc>
+                  <a:txBody>
+                    <a:bodyPr/>
+                    <a:lstStyle/>
+                    <a:p>
+                      <a:pPr algn="r"/>
+                      <a:r>
+                        <a:rPr lang="en-US" sz="1800"/>
+                        <a:t>405,583</a:t>
+                      </a:r>
+                    </a:p>
+                  </a:txBody>
+                  <a:tcPr marL="91426" marR="91426" marT="45713" marB="45713" anchor="ctr">
+                    <a:lnL>
+                      <a:noFill/>
+                    </a:lnL>
+                    <a:lnR>
+                      <a:noFill/>
+                    </a:lnR>
+                    <a:lnT>
+                      <a:noFill/>
+                    </a:lnT>
+                    <a:lnB>
+                      <a:noFill/>
+                    </a:lnB>
+                    <a:noFill/>
+                  </a:tcPr>
+                </a:tc>
+                <a:tc>
+                  <a:txBody>
+                    <a:bodyPr/>
+                    <a:lstStyle/>
+                    <a:p>
+                      <a:pPr algn="r"/>
+                      <a:r>
+                        <a:rPr lang="en-US" sz="1800"/>
+                        <a:t>851.15</a:t>
+                      </a:r>
+                    </a:p>
+                  </a:txBody>
+                  <a:tcPr marL="91426" marR="91426" marT="45713" marB="45713" anchor="ctr">
+                    <a:lnL>
+                      <a:noFill/>
+                    </a:lnL>
+                    <a:lnR>
+                      <a:noFill/>
+                    </a:lnR>
+                    <a:lnT>
+                      <a:noFill/>
+                    </a:lnT>
+                    <a:lnB>
+                      <a:noFill/>
+                    </a:lnB>
+                    <a:noFill/>
+                  </a:tcPr>
+                </a:tc>
+                <a:tc>
+                  <a:txBody>
+                    <a:bodyPr/>
+                    <a:lstStyle/>
+                    <a:p>
+                      <a:pPr algn="r"/>
+                      <a:r>
+                        <a:rPr lang="en-US" sz="1800"/>
+                        <a:t>0.002099</a:t>
+                      </a:r>
+                    </a:p>
+                  </a:txBody>
+                  <a:tcPr marL="91426" marR="91426" marT="45713" marB="45713" anchor="ctr">
+                    <a:lnL>
+                      <a:noFill/>
+                    </a:lnL>
+                    <a:lnR>
+                      <a:noFill/>
+                    </a:lnR>
+                    <a:lnT>
+                      <a:noFill/>
+                    </a:lnT>
+                    <a:lnB>
+                      <a:noFill/>
+                    </a:lnB>
+                    <a:noFill/>
+                  </a:tcPr>
+                </a:tc>
+                <a:tc>
+                  <a:txBody>
+                    <a:bodyPr/>
+                    <a:lstStyle/>
+                    <a:p>
+                      <a:pPr algn="r"/>
+                      <a:r>
+                        <a:rPr lang="en-US" sz="1800"/>
+                        <a:t>476.51</a:t>
+                      </a:r>
+                    </a:p>
+                  </a:txBody>
+                  <a:tcPr marL="91426" marR="91426" marT="45713" marB="45713" anchor="ctr">
+                    <a:lnL>
+                      <a:noFill/>
+                    </a:lnL>
+                    <a:lnR>
+                      <a:noFill/>
+                    </a:lnR>
+                    <a:lnT>
+                      <a:noFill/>
+                    </a:lnT>
+                    <a:lnB>
+                      <a:noFill/>
+                    </a:lnB>
+                    <a:noFill/>
+                  </a:tcPr>
+                </a:tc>
+                <a:extLst>
+                  <a:ext uri="{0D108BD9-81ED-4DB2-BD59-A6C34878D82A}">
+                    <a16:rowId xmlns:a16="http://schemas.microsoft.com/office/drawing/2014/main" val="1964440649"/>
+                  </a:ext>
+                </a:extLst>
+              </a:tr>
+              <a:tr h="365702">
+                <a:tc>
+                  <a:txBody>
+                    <a:bodyPr/>
+                    <a:lstStyle/>
+                    <a:p>
+                      <a:r>
+                        <a:rPr lang="en-US" sz="1800"/>
+                        <a:t>9</a:t>
+                      </a:r>
+                    </a:p>
+                  </a:txBody>
+                  <a:tcPr marL="91426" marR="91426" marT="45713" marB="45713" anchor="ctr">
+                    <a:lnL>
+                      <a:noFill/>
+                    </a:lnL>
+                    <a:lnR>
+                      <a:noFill/>
+                    </a:lnR>
+                    <a:lnT>
+                      <a:noFill/>
+                    </a:lnT>
+                    <a:lnB>
+                      <a:noFill/>
+                    </a:lnB>
+                    <a:noFill/>
+                  </a:tcPr>
+                </a:tc>
+                <a:tc>
+                  <a:txBody>
+                    <a:bodyPr/>
+                    <a:lstStyle/>
+                    <a:p>
+                      <a:pPr algn="r"/>
+                      <a:r>
+                        <a:rPr lang="en-US" sz="1800"/>
+                        <a:t>779,375</a:t>
+                      </a:r>
+                    </a:p>
+                  </a:txBody>
+                  <a:tcPr marL="91426" marR="91426" marT="45713" marB="45713" anchor="ctr">
+                    <a:lnL>
+                      <a:noFill/>
+                    </a:lnL>
+                    <a:lnR>
+                      <a:noFill/>
+                    </a:lnR>
+                    <a:lnT>
+                      <a:noFill/>
+                    </a:lnT>
+                    <a:lnB>
+                      <a:noFill/>
+                    </a:lnB>
+                    <a:noFill/>
+                  </a:tcPr>
+                </a:tc>
+                <a:tc>
+                  <a:txBody>
+                    <a:bodyPr/>
+                    <a:lstStyle/>
+                    <a:p>
+                      <a:pPr algn="r"/>
+                      <a:r>
+                        <a:rPr lang="en-US" sz="1800"/>
+                        <a:t>1722.48</a:t>
+                      </a:r>
+                    </a:p>
+                  </a:txBody>
+                  <a:tcPr marL="91426" marR="91426" marT="45713" marB="45713" anchor="ctr">
+                    <a:lnL>
+                      <a:noFill/>
+                    </a:lnL>
+                    <a:lnR>
+                      <a:noFill/>
+                    </a:lnR>
+                    <a:lnT>
+                      <a:noFill/>
+                    </a:lnT>
+                    <a:lnB>
+                      <a:noFill/>
+                    </a:lnB>
+                    <a:noFill/>
+                  </a:tcPr>
+                </a:tc>
+                <a:tc>
+                  <a:txBody>
+                    <a:bodyPr/>
+                    <a:lstStyle/>
+                    <a:p>
+                      <a:pPr algn="r"/>
+                      <a:r>
+                        <a:rPr lang="en-US" sz="1800"/>
+                        <a:t>0.002210</a:t>
+                      </a:r>
+                    </a:p>
+                  </a:txBody>
+                  <a:tcPr marL="91426" marR="91426" marT="45713" marB="45713" anchor="ctr">
+                    <a:lnL>
+                      <a:noFill/>
+                    </a:lnL>
+                    <a:lnR>
+                      <a:noFill/>
+                    </a:lnR>
+                    <a:lnT>
+                      <a:noFill/>
+                    </a:lnT>
+                    <a:lnB>
+                      <a:noFill/>
+                    </a:lnB>
+                    <a:noFill/>
+                  </a:tcPr>
+                </a:tc>
+                <a:tc>
+                  <a:txBody>
+                    <a:bodyPr/>
+                    <a:lstStyle/>
+                    <a:p>
+                      <a:pPr algn="r"/>
+                      <a:r>
+                        <a:rPr lang="en-US" sz="1800"/>
+                        <a:t>452.47</a:t>
+                      </a:r>
+                    </a:p>
+                  </a:txBody>
+                  <a:tcPr marL="91426" marR="91426" marT="45713" marB="45713" anchor="ctr">
+                    <a:lnL>
+                      <a:noFill/>
+                    </a:lnL>
+                    <a:lnR>
+                      <a:noFill/>
+                    </a:lnR>
+                    <a:lnT>
+                      <a:noFill/>
+                    </a:lnT>
+                    <a:lnB>
+                      <a:noFill/>
+                    </a:lnB>
+                    <a:noFill/>
+                  </a:tcPr>
+                </a:tc>
+                <a:extLst>
+                  <a:ext uri="{0D108BD9-81ED-4DB2-BD59-A6C34878D82A}">
+                    <a16:rowId xmlns:a16="http://schemas.microsoft.com/office/drawing/2014/main" val="2801192908"/>
+                  </a:ext>
+                </a:extLst>
+              </a:tr>
+              <a:tr h="365702">
+                <a:tc>
+                  <a:txBody>
+                    <a:bodyPr/>
+                    <a:lstStyle/>
+                    <a:p>
+                      <a:r>
+                        <a:rPr lang="en-US" sz="1800"/>
+                        <a:t>10</a:t>
+                      </a:r>
+                    </a:p>
+                  </a:txBody>
+                  <a:tcPr marL="91426" marR="91426" marT="45713" marB="45713" anchor="ctr">
+                    <a:lnL>
+                      <a:noFill/>
+                    </a:lnL>
+                    <a:lnR>
+                      <a:noFill/>
+                    </a:lnR>
+                    <a:lnT>
+                      <a:noFill/>
+                    </a:lnT>
+                    <a:lnB>
+                      <a:noFill/>
+                    </a:lnB>
+                    <a:noFill/>
+                  </a:tcPr>
+                </a:tc>
+                <a:tc>
+                  <a:txBody>
+                    <a:bodyPr/>
+                    <a:lstStyle/>
+                    <a:p>
+                      <a:pPr algn="r"/>
+                      <a:r>
+                        <a:rPr lang="en-US" sz="1800"/>
+                        <a:t>372,417</a:t>
+                      </a:r>
+                    </a:p>
+                  </a:txBody>
+                  <a:tcPr marL="91426" marR="91426" marT="45713" marB="45713" anchor="ctr">
+                    <a:lnL>
+                      <a:noFill/>
+                    </a:lnL>
+                    <a:lnR>
+                      <a:noFill/>
+                    </a:lnR>
+                    <a:lnT>
+                      <a:noFill/>
+                    </a:lnT>
+                    <a:lnB>
+                      <a:noFill/>
+                    </a:lnB>
+                    <a:noFill/>
+                  </a:tcPr>
+                </a:tc>
+                <a:tc>
+                  <a:txBody>
+                    <a:bodyPr/>
+                    <a:lstStyle/>
+                    <a:p>
+                      <a:pPr algn="r"/>
+                      <a:r>
+                        <a:rPr lang="en-US" sz="1800"/>
+                        <a:t>821.20</a:t>
+                      </a:r>
+                    </a:p>
+                  </a:txBody>
+                  <a:tcPr marL="91426" marR="91426" marT="45713" marB="45713" anchor="ctr">
+                    <a:lnL>
+                      <a:noFill/>
+                    </a:lnL>
+                    <a:lnR>
+                      <a:noFill/>
+                    </a:lnR>
+                    <a:lnT>
+                      <a:noFill/>
+                    </a:lnT>
+                    <a:lnB>
+                      <a:noFill/>
+                    </a:lnB>
+                    <a:noFill/>
+                  </a:tcPr>
+                </a:tc>
+                <a:tc>
+                  <a:txBody>
+                    <a:bodyPr/>
+                    <a:lstStyle/>
+                    <a:p>
+                      <a:pPr algn="r"/>
+                      <a:r>
+                        <a:rPr lang="en-US" sz="1800"/>
+                        <a:t>0.002205</a:t>
+                      </a:r>
+                    </a:p>
+                  </a:txBody>
+                  <a:tcPr marL="91426" marR="91426" marT="45713" marB="45713" anchor="ctr">
+                    <a:lnL>
+                      <a:noFill/>
+                    </a:lnL>
+                    <a:lnR>
+                      <a:noFill/>
+                    </a:lnR>
+                    <a:lnT>
+                      <a:noFill/>
+                    </a:lnT>
+                    <a:lnB>
+                      <a:noFill/>
+                    </a:lnB>
+                    <a:noFill/>
+                  </a:tcPr>
+                </a:tc>
+                <a:tc>
+                  <a:txBody>
+                    <a:bodyPr/>
+                    <a:lstStyle/>
+                    <a:p>
+                      <a:pPr algn="r"/>
+                      <a:r>
+                        <a:rPr lang="en-US" sz="1800" dirty="0"/>
+                        <a:t>453.50</a:t>
+                      </a:r>
+                    </a:p>
+                  </a:txBody>
+                  <a:tcPr marL="91426" marR="91426" marT="45713" marB="45713" anchor="ctr">
+                    <a:lnL>
+                      <a:noFill/>
+                    </a:lnL>
+                    <a:lnR>
+                      <a:noFill/>
+                    </a:lnR>
+                    <a:lnT>
+                      <a:noFill/>
+                    </a:lnT>
+                    <a:lnB>
+                      <a:noFill/>
+                    </a:lnB>
+                    <a:noFill/>
+                  </a:tcPr>
+                </a:tc>
+                <a:extLst>
+                  <a:ext uri="{0D108BD9-81ED-4DB2-BD59-A6C34878D82A}">
+                    <a16:rowId xmlns:a16="http://schemas.microsoft.com/office/drawing/2014/main" val="1454671703"/>
+                  </a:ext>
+                </a:extLst>
+              </a:tr>
+            </a:tbl>
+          </a:graphicData>
+        </a:graphic>
+      </p:graphicFrame>
+    </p:spTree>
+    <p:extLst>
+      <p:ext uri="{BB962C8B-B14F-4D97-AF65-F5344CB8AC3E}">
+        <p14:creationId xmlns:p14="http://schemas.microsoft.com/office/powerpoint/2010/main" val="3163057977"/>
+      </p:ext>
+    </p:extLst>
+  </p:cSld>
+  <p:clrMapOvr>
+    <a:masterClrMapping/>
+  </p:clrMapOvr>
+</p:sld>
+</file>
+
+<file path=ppt/slides/slide11.xml><?xml version="1.0" encoding="utf-8"?>
+<p:sld xmlns:a="http://schemas.openxmlformats.org/drawingml/2006/main" xmlns:r="http://schemas.openxmlformats.org/officeDocument/2006/relationships" xmlns:p="http://schemas.openxmlformats.org/presentationml/2006/main">
+  <p:cSld>
+    <p:spTree>
+      <p:nvGrpSpPr>
+        <p:cNvPr id="1" name=""/>
+        <p:cNvGrpSpPr/>
+        <p:nvPr/>
+      </p:nvGrpSpPr>
+      <p:grpSpPr>
+        <a:xfrm>
+          <a:off x="0" y="0"/>
+          <a:ext cx="0" cy="0"/>
+          <a:chOff x="0" y="0"/>
+          <a:chExt cx="0" cy="0"/>
+        </a:xfrm>
+      </p:grpSpPr>
+      <p:sp>
+        <p:nvSpPr>
+          <p:cNvPr id="2" name="Title 1">
+            <a:extLst>
+              <a:ext uri="{FF2B5EF4-FFF2-40B4-BE49-F238E27FC236}">
+                <a16:creationId xmlns:a16="http://schemas.microsoft.com/office/drawing/2014/main" id="{512B0150-081F-3211-A95E-E15A98B8D537}"/>
+              </a:ext>
+            </a:extLst>
+          </p:cNvPr>
+          <p:cNvSpPr>
+            <a:spLocks noGrp="1"/>
+          </p:cNvSpPr>
+          <p:nvPr>
+            <p:ph type="title"/>
+          </p:nvPr>
+        </p:nvSpPr>
+        <p:spPr>
+          <a:xfrm>
+            <a:off x="0" y="263527"/>
+            <a:ext cx="10058400" cy="1450757"/>
+          </a:xfrm>
+        </p:spPr>
+        <p:txBody>
+          <a:bodyPr/>
+          <a:lstStyle/>
+          <a:p>
+            <a:r>
+              <a:rPr lang="en-US" dirty="0" err="1"/>
+              <a:t>Kết</a:t>
+            </a:r>
+            <a:r>
+              <a:rPr lang="en-US" dirty="0"/>
+              <a:t> </a:t>
+            </a:r>
+            <a:r>
+              <a:rPr lang="en-US" dirty="0" err="1"/>
+              <a:t>quả</a:t>
+            </a:r>
+            <a:r>
+              <a:rPr lang="en-US" dirty="0"/>
+              <a:t> - Attack A</a:t>
+            </a:r>
           </a:p>
         </p:txBody>
       </p:sp>
@@ -3976,49 +5732,473 @@
           <a:bodyPr/>
           <a:lstStyle/>
           <a:p>
-            <a:pPr marL="0" indent="0">
-              <a:buNone/>
+            <a:pPr lvl="1">
+              <a:buFontTx/>
+              <a:buChar char="-"/>
             </a:pPr>
             <a:r>
-              <a:rPr lang="en-US" dirty="0"/>
-              <a:t>// </a:t>
-            </a:r>
-            <a:r>
-              <a:rPr lang="en-US" dirty="0" err="1"/>
-              <a:t>đưa</a:t>
-            </a:r>
-            <a:r>
-              <a:rPr lang="en-US" dirty="0"/>
-              <a:t> </a:t>
-            </a:r>
-            <a:r>
-              <a:rPr lang="en-US" dirty="0" err="1"/>
-              <a:t>số</a:t>
-            </a:r>
-            <a:r>
-              <a:rPr lang="en-US" dirty="0"/>
-              <a:t> </a:t>
-            </a:r>
-            <a:r>
-              <a:rPr lang="en-US" dirty="0" err="1"/>
-              <a:t>liệu</a:t>
-            </a:r>
-            <a:r>
-              <a:rPr lang="en-US" dirty="0"/>
-              <a:t> </a:t>
-            </a:r>
-            <a:r>
-              <a:rPr lang="en-US" dirty="0" err="1"/>
+              <a:rPr lang="en-US" dirty="0" err="1">
+                <a:latin typeface="Calibri (Body)"/>
+              </a:rPr>
+              <a:t>Số</a:t>
+            </a:r>
+            <a:r>
+              <a:rPr lang="en-US" dirty="0">
+                <a:latin typeface="Calibri (Body)"/>
+              </a:rPr>
+              <a:t> oracle queries </a:t>
+            </a:r>
+            <a:r>
+              <a:rPr lang="en-US" dirty="0" err="1">
+                <a:latin typeface="Calibri (Body)"/>
+              </a:rPr>
+              <a:t>trung</a:t>
+            </a:r>
+            <a:r>
+              <a:rPr lang="en-US" dirty="0">
+                <a:latin typeface="Calibri (Body)"/>
+              </a:rPr>
+              <a:t> </a:t>
+            </a:r>
+            <a:r>
+              <a:rPr lang="en-US" dirty="0" err="1">
+                <a:latin typeface="Calibri (Body)"/>
+              </a:rPr>
+              <a:t>bình</a:t>
+            </a:r>
+            <a:r>
+              <a:rPr lang="en-US" dirty="0">
+                <a:latin typeface="Calibri (Body)"/>
+              </a:rPr>
+              <a:t>≈ 327,846 queries / run</a:t>
+            </a:r>
+          </a:p>
+          <a:p>
+            <a:pPr lvl="1">
+              <a:buFontTx/>
+              <a:buChar char="-"/>
+            </a:pPr>
+            <a:r>
+              <a:rPr lang="en-US" dirty="0" err="1">
+                <a:latin typeface="Calibri (Body)"/>
+              </a:rPr>
+              <a:t>Thời</a:t>
+            </a:r>
+            <a:r>
+              <a:rPr lang="en-US" dirty="0">
+                <a:latin typeface="Calibri (Body)"/>
+              </a:rPr>
+              <a:t> </a:t>
+            </a:r>
+            <a:r>
+              <a:rPr lang="en-US" dirty="0" err="1">
+                <a:latin typeface="Calibri (Body)"/>
+              </a:rPr>
+              <a:t>gian</a:t>
+            </a:r>
+            <a:r>
+              <a:rPr lang="en-US" dirty="0">
+                <a:latin typeface="Calibri (Body)"/>
+              </a:rPr>
+              <a:t> </a:t>
+            </a:r>
+            <a:r>
+              <a:rPr lang="en-US" dirty="0" err="1">
+                <a:latin typeface="Calibri (Body)"/>
+              </a:rPr>
+              <a:t>tấn</a:t>
+            </a:r>
+            <a:r>
+              <a:rPr lang="en-US" dirty="0">
+                <a:latin typeface="Calibri (Body)"/>
+              </a:rPr>
+              <a:t> </a:t>
+            </a:r>
+            <a:r>
+              <a:rPr lang="en-US" dirty="0" err="1">
+                <a:latin typeface="Calibri (Body)"/>
+              </a:rPr>
+              <a:t>công</a:t>
+            </a:r>
+            <a:r>
+              <a:rPr lang="en-US" dirty="0">
+                <a:latin typeface="Calibri (Body)"/>
+              </a:rPr>
+              <a:t> </a:t>
+            </a:r>
+            <a:r>
+              <a:rPr lang="en-US" dirty="0" err="1">
+                <a:latin typeface="Calibri (Body)"/>
+              </a:rPr>
+              <a:t>trung</a:t>
+            </a:r>
+            <a:r>
+              <a:rPr lang="en-US" dirty="0">
+                <a:latin typeface="Calibri (Body)"/>
+              </a:rPr>
+              <a:t> </a:t>
+            </a:r>
+            <a:r>
+              <a:rPr lang="en-US" dirty="0" err="1">
+                <a:latin typeface="Calibri (Body)"/>
+              </a:rPr>
+              <a:t>bình</a:t>
+            </a:r>
+            <a:r>
+              <a:rPr lang="en-US" dirty="0">
+                <a:latin typeface="Calibri (Body)"/>
+              </a:rPr>
+              <a:t>≈ 678.72 </a:t>
+            </a:r>
+            <a:r>
+              <a:rPr lang="en-US" dirty="0" err="1">
+                <a:latin typeface="Calibri (Body)"/>
+              </a:rPr>
+              <a:t>giây</a:t>
+            </a:r>
+            <a:r>
+              <a:rPr lang="en-US" dirty="0">
+                <a:latin typeface="Calibri (Body)"/>
+              </a:rPr>
+              <a:t> ≈ 11.31 </a:t>
+            </a:r>
+            <a:r>
+              <a:rPr lang="en-US" dirty="0" err="1">
+                <a:latin typeface="Calibri (Body)"/>
+              </a:rPr>
+              <a:t>phút</a:t>
+            </a:r>
+            <a:endParaRPr lang="en-US" dirty="0">
+              <a:latin typeface="Calibri (Body)"/>
+            </a:endParaRPr>
+          </a:p>
+          <a:p>
+            <a:pPr lvl="1">
+              <a:buFontTx/>
+              <a:buChar char="-"/>
+            </a:pPr>
+            <a:r>
+              <a:rPr lang="en-US" dirty="0" err="1">
+                <a:latin typeface="Calibri (Body)"/>
+              </a:rPr>
+              <a:t>Thời</a:t>
+            </a:r>
+            <a:r>
+              <a:rPr lang="en-US" dirty="0">
+                <a:latin typeface="Calibri (Body)"/>
+              </a:rPr>
+              <a:t> </a:t>
+            </a:r>
+            <a:r>
+              <a:rPr lang="en-US" dirty="0" err="1">
+                <a:latin typeface="Calibri (Body)"/>
+              </a:rPr>
+              <a:t>gian</a:t>
+            </a:r>
+            <a:r>
+              <a:rPr lang="en-US" dirty="0">
+                <a:latin typeface="Calibri (Body)"/>
+              </a:rPr>
+              <a:t> </a:t>
+            </a:r>
+            <a:r>
+              <a:rPr lang="en-US" dirty="0" err="1">
+                <a:latin typeface="Calibri (Body)"/>
+              </a:rPr>
+              <a:t>trung</a:t>
+            </a:r>
+            <a:r>
+              <a:rPr lang="en-US" dirty="0">
+                <a:latin typeface="Calibri (Body)"/>
+              </a:rPr>
+              <a:t> </a:t>
+            </a:r>
+            <a:r>
+              <a:rPr lang="en-US" dirty="0" err="1">
+                <a:latin typeface="Calibri (Body)"/>
+              </a:rPr>
+              <a:t>bình</a:t>
+            </a:r>
+            <a:r>
+              <a:rPr lang="en-US" dirty="0">
+                <a:latin typeface="Calibri (Body)"/>
+              </a:rPr>
+              <a:t> / query≈ 0.002048 </a:t>
+            </a:r>
+            <a:r>
+              <a:rPr lang="en-US" dirty="0" err="1">
+                <a:latin typeface="Calibri (Body)"/>
+              </a:rPr>
+              <a:t>giây</a:t>
+            </a:r>
+            <a:r>
+              <a:rPr lang="en-US" dirty="0">
+                <a:latin typeface="Calibri (Body)"/>
+              </a:rPr>
+              <a:t> ≈ 2.05 </a:t>
+            </a:r>
+            <a:r>
+              <a:rPr lang="en-US" dirty="0" err="1">
+                <a:latin typeface="Calibri (Body)"/>
+              </a:rPr>
+              <a:t>ms</a:t>
+            </a:r>
+            <a:endParaRPr lang="en-US" dirty="0">
+              <a:latin typeface="Calibri (Body)"/>
+            </a:endParaRPr>
+          </a:p>
+          <a:p>
+            <a:pPr lvl="1">
+              <a:buFontTx/>
+              <a:buChar char="-"/>
+            </a:pPr>
+            <a:r>
+              <a:rPr lang="en-US" dirty="0">
+                <a:latin typeface="Calibri (Body)"/>
+              </a:rPr>
+              <a:t>Throughput (QPS) </a:t>
+            </a:r>
+            <a:r>
+              <a:rPr lang="en-US" dirty="0" err="1">
+                <a:latin typeface="Calibri (Body)"/>
+              </a:rPr>
+              <a:t>trung</a:t>
+            </a:r>
+            <a:r>
+              <a:rPr lang="en-US" dirty="0">
+                <a:latin typeface="Calibri (Body)"/>
+              </a:rPr>
+              <a:t> </a:t>
+            </a:r>
+            <a:r>
+              <a:rPr lang="en-US" dirty="0" err="1">
+                <a:latin typeface="Calibri (Body)"/>
+              </a:rPr>
+              <a:t>bình</a:t>
+            </a:r>
+            <a:r>
+              <a:rPr lang="en-US" dirty="0">
+                <a:latin typeface="Calibri (Body)"/>
+              </a:rPr>
+              <a:t>≈ 489.82 queries / second</a:t>
+            </a:r>
+          </a:p>
+          <a:p>
+            <a:pPr lvl="1">
+              <a:buFontTx/>
+              <a:buChar char="-"/>
+            </a:pPr>
+            <a:r>
+              <a:rPr lang="vi-VN" dirty="0">
+                <a:latin typeface="Calibri (Body)"/>
+              </a:rPr>
+              <a:t>Avg time / query:Rất ổn định: ~1.93–2.21 ms</a:t>
+            </a:r>
+            <a:r>
+              <a:rPr lang="en-US" dirty="0">
+                <a:latin typeface="Calibri (Body)"/>
+              </a:rPr>
+              <a:t> -&gt;</a:t>
+            </a:r>
+            <a:r>
+              <a:rPr lang="vi-VN" dirty="0">
+                <a:latin typeface="Calibri (Body)"/>
+              </a:rPr>
+              <a:t> chứng minh uniform timing path</a:t>
+            </a:r>
+            <a:endParaRPr lang="en-US" dirty="0">
+              <a:latin typeface="Calibri (Body)"/>
+            </a:endParaRPr>
+          </a:p>
+          <a:p>
+            <a:pPr lvl="1">
+              <a:buFontTx/>
+              <a:buChar char="-"/>
+            </a:pPr>
+            <a:r>
+              <a:rPr lang="en-US" dirty="0">
+                <a:latin typeface="Calibri (Body)"/>
+              </a:rPr>
+              <a:t>QPS: ~450–520 QPS</a:t>
+            </a:r>
+          </a:p>
+          <a:p>
+            <a:pPr lvl="1">
+              <a:buFontTx/>
+              <a:buChar char="-"/>
+            </a:pPr>
+            <a:r>
+              <a:rPr lang="vi-VN" dirty="0">
+                <a:latin typeface="Calibri (Body)"/>
+              </a:rPr>
+              <a:t>Queries:</a:t>
+            </a:r>
+            <a:endParaRPr lang="en-US" dirty="0">
+              <a:latin typeface="Calibri (Body)"/>
+            </a:endParaRPr>
+          </a:p>
+          <a:p>
+            <a:pPr lvl="2">
+              <a:buFontTx/>
+              <a:buChar char="-"/>
+            </a:pPr>
+            <a:r>
+              <a:rPr lang="vi-VN" dirty="0">
+                <a:latin typeface="Calibri (Body)"/>
+              </a:rPr>
+              <a:t>Min: 46k</a:t>
+            </a:r>
+            <a:endParaRPr lang="en-US" dirty="0">
+              <a:latin typeface="Calibri (Body)"/>
+            </a:endParaRPr>
+          </a:p>
+          <a:p>
+            <a:pPr lvl="2">
+              <a:buFontTx/>
+              <a:buChar char="-"/>
+            </a:pPr>
+            <a:r>
+              <a:rPr lang="vi-VN" dirty="0">
+                <a:latin typeface="Calibri (Body)"/>
+              </a:rPr>
+              <a:t>Max: 779k</a:t>
+            </a:r>
+            <a:r>
+              <a:rPr lang="en-US" dirty="0">
+                <a:latin typeface="Calibri (Body)"/>
+              </a:rPr>
+              <a:t> -&gt; </a:t>
+            </a:r>
+            <a:r>
+              <a:rPr lang="vi-VN" dirty="0">
+                <a:latin typeface="Calibri (Body)"/>
+              </a:rPr>
+              <a:t>dao động lớn (</a:t>
+            </a:r>
+            <a:r>
+              <a:rPr lang="en-US" dirty="0" err="1">
+                <a:latin typeface="Calibri (Body)"/>
+              </a:rPr>
+              <a:t>phụ</a:t>
+            </a:r>
+            <a:r>
+              <a:rPr lang="en-US" dirty="0">
+                <a:latin typeface="Calibri (Body)"/>
+              </a:rPr>
+              <a:t> </a:t>
+            </a:r>
+            <a:r>
+              <a:rPr lang="en-US" dirty="0" err="1">
+                <a:latin typeface="Calibri (Body)"/>
+              </a:rPr>
+              <a:t>thuộc</a:t>
+            </a:r>
+            <a:r>
+              <a:rPr lang="en-US" dirty="0">
+                <a:latin typeface="Calibri (Body)"/>
+              </a:rPr>
+              <a:t> </a:t>
+            </a:r>
+            <a:r>
+              <a:rPr lang="en-US" dirty="0" err="1">
+                <a:latin typeface="Calibri (Body)"/>
+              </a:rPr>
               <a:t>vào</a:t>
             </a:r>
-            <a:endParaRPr lang="en-US" dirty="0"/>
+            <a:r>
+              <a:rPr lang="en-US" dirty="0">
+                <a:latin typeface="Calibri (Body)"/>
+              </a:rPr>
+              <a:t> </a:t>
+            </a:r>
+            <a:r>
+              <a:rPr lang="en-US" dirty="0" err="1">
+                <a:latin typeface="Calibri (Body)"/>
+              </a:rPr>
+              <a:t>việc</a:t>
+            </a:r>
+            <a:r>
+              <a:rPr lang="en-US" dirty="0">
+                <a:latin typeface="Calibri (Body)"/>
+              </a:rPr>
+              <a:t> </a:t>
+            </a:r>
+            <a:r>
+              <a:rPr lang="en-US" dirty="0" err="1">
+                <a:latin typeface="Calibri (Body)"/>
+              </a:rPr>
+              <a:t>đoán</a:t>
+            </a:r>
+            <a:r>
+              <a:rPr lang="en-US" dirty="0">
+                <a:latin typeface="Calibri (Body)"/>
+              </a:rPr>
+              <a:t> s0 </a:t>
+            </a:r>
+            <a:r>
+              <a:rPr lang="en-US" dirty="0" err="1">
+                <a:latin typeface="Calibri (Body)"/>
+              </a:rPr>
+              <a:t>và</a:t>
+            </a:r>
+            <a:r>
+              <a:rPr lang="en-US" dirty="0">
+                <a:latin typeface="Calibri (Body)"/>
+              </a:rPr>
+              <a:t> </a:t>
+            </a:r>
+            <a:r>
+              <a:rPr lang="en-US" dirty="0" err="1">
+                <a:latin typeface="Calibri (Body)"/>
+              </a:rPr>
+              <a:t>độ</a:t>
+            </a:r>
+            <a:r>
+              <a:rPr lang="en-US" dirty="0">
+                <a:latin typeface="Calibri (Body)"/>
+              </a:rPr>
+              <a:t> </a:t>
+            </a:r>
+            <a:r>
+              <a:rPr lang="en-US" dirty="0" err="1">
+                <a:latin typeface="Calibri (Body)"/>
+              </a:rPr>
+              <a:t>hẹp</a:t>
+            </a:r>
+            <a:r>
+              <a:rPr lang="en-US" dirty="0">
+                <a:latin typeface="Calibri (Body)"/>
+              </a:rPr>
+              <a:t> </a:t>
+            </a:r>
+            <a:r>
+              <a:rPr lang="en-US" dirty="0" err="1">
+                <a:latin typeface="Calibri (Body)"/>
+              </a:rPr>
+              <a:t>khoảng</a:t>
+            </a:r>
+            <a:r>
+              <a:rPr lang="en-US" dirty="0">
+                <a:latin typeface="Calibri (Body)"/>
+              </a:rPr>
+              <a:t> M</a:t>
+            </a:r>
+            <a:r>
+              <a:rPr lang="vi-VN" dirty="0">
+                <a:latin typeface="Calibri (Body)"/>
+              </a:rPr>
+              <a:t>)</a:t>
+            </a:r>
+            <a:endParaRPr lang="en-US" dirty="0">
+              <a:latin typeface="Calibri (Body)"/>
+            </a:endParaRPr>
           </a:p>
         </p:txBody>
       </p:sp>
     </p:spTree>
     <p:extLst>
       <p:ext uri="{BB962C8B-B14F-4D97-AF65-F5344CB8AC3E}">
-        <p14:creationId xmlns:p14="http://schemas.microsoft.com/office/powerpoint/2010/main" val="3163057977"/>
+        <p14:creationId xmlns:p14="http://schemas.microsoft.com/office/powerpoint/2010/main" val="3609478514"/>
       </p:ext>
     </p:extLst>
   </p:cSld>
@@ -4028,7 +6208,845 @@
 </p:sld>
 </file>
 
-<file path=ppt/slides/slide11.xml><?xml version="1.0" encoding="utf-8"?>
+<file path=ppt/slides/slide12.xml><?xml version="1.0" encoding="utf-8"?>
+<p:sld xmlns:a="http://schemas.openxmlformats.org/drawingml/2006/main" xmlns:r="http://schemas.openxmlformats.org/officeDocument/2006/relationships" xmlns:p="http://schemas.openxmlformats.org/presentationml/2006/main">
+  <p:cSld>
+    <p:spTree>
+      <p:nvGrpSpPr>
+        <p:cNvPr id="1" name=""/>
+        <p:cNvGrpSpPr/>
+        <p:nvPr/>
+      </p:nvGrpSpPr>
+      <p:grpSpPr>
+        <a:xfrm>
+          <a:off x="0" y="0"/>
+          <a:ext cx="0" cy="0"/>
+          <a:chOff x="0" y="0"/>
+          <a:chExt cx="0" cy="0"/>
+        </a:xfrm>
+      </p:grpSpPr>
+      <p:sp>
+        <p:nvSpPr>
+          <p:cNvPr id="2" name="Title 1">
+            <a:extLst>
+              <a:ext uri="{FF2B5EF4-FFF2-40B4-BE49-F238E27FC236}">
+                <a16:creationId xmlns:a16="http://schemas.microsoft.com/office/drawing/2014/main" id="{512B0150-081F-3211-A95E-E15A98B8D537}"/>
+              </a:ext>
+            </a:extLst>
+          </p:cNvPr>
+          <p:cNvSpPr>
+            <a:spLocks noGrp="1"/>
+          </p:cNvSpPr>
+          <p:nvPr>
+            <p:ph type="title"/>
+          </p:nvPr>
+        </p:nvSpPr>
+        <p:spPr>
+          <a:xfrm>
+            <a:off x="0" y="263527"/>
+            <a:ext cx="10058400" cy="1450757"/>
+          </a:xfrm>
+        </p:spPr>
+        <p:txBody>
+          <a:bodyPr/>
+          <a:lstStyle/>
+          <a:p>
+            <a:r>
+              <a:rPr lang="en-US" dirty="0" err="1"/>
+              <a:t>Kết</a:t>
+            </a:r>
+            <a:r>
+              <a:rPr lang="en-US" dirty="0"/>
+              <a:t> </a:t>
+            </a:r>
+            <a:r>
+              <a:rPr lang="en-US" dirty="0" err="1"/>
+              <a:t>quả</a:t>
+            </a:r>
+            <a:r>
+              <a:rPr lang="en-US" dirty="0"/>
+              <a:t> - Attack A</a:t>
+            </a:r>
+          </a:p>
+        </p:txBody>
+      </p:sp>
+      <p:sp>
+        <p:nvSpPr>
+          <p:cNvPr id="3" name="Content Placeholder 2">
+            <a:extLst>
+              <a:ext uri="{FF2B5EF4-FFF2-40B4-BE49-F238E27FC236}">
+                <a16:creationId xmlns:a16="http://schemas.microsoft.com/office/drawing/2014/main" id="{C5050B79-4971-0890-4933-4B8D772F68A7}"/>
+              </a:ext>
+            </a:extLst>
+          </p:cNvPr>
+          <p:cNvSpPr>
+            <a:spLocks noGrp="1"/>
+          </p:cNvSpPr>
+          <p:nvPr>
+            <p:ph idx="1"/>
+          </p:nvPr>
+        </p:nvSpPr>
+        <p:spPr>
+          <a:xfrm>
+            <a:off x="0" y="1940625"/>
+            <a:ext cx="5727940" cy="4023360"/>
+          </a:xfrm>
+        </p:spPr>
+        <p:txBody>
+          <a:bodyPr>
+            <a:normAutofit/>
+          </a:bodyPr>
+          <a:lstStyle/>
+          <a:p>
+            <a:pPr lvl="1">
+              <a:buFontTx/>
+              <a:buChar char="-"/>
+            </a:pPr>
+            <a:r>
+              <a:rPr lang="en-US" sz="2400" dirty="0">
+                <a:latin typeface="Calibri (Body)"/>
+              </a:rPr>
+              <a:t>Sau </a:t>
+            </a:r>
+            <a:r>
+              <a:rPr lang="en-US" sz="2400" dirty="0" err="1">
+                <a:latin typeface="Calibri (Body)"/>
+              </a:rPr>
+              <a:t>khi</a:t>
+            </a:r>
+            <a:r>
+              <a:rPr lang="en-US" sz="2400" dirty="0">
+                <a:latin typeface="Calibri (Body)"/>
+              </a:rPr>
+              <a:t> </a:t>
+            </a:r>
+            <a:r>
+              <a:rPr lang="en-US" sz="2400" dirty="0" err="1">
+                <a:latin typeface="Calibri (Body)"/>
+              </a:rPr>
+              <a:t>vá</a:t>
+            </a:r>
+            <a:r>
+              <a:rPr lang="en-US" sz="2400" dirty="0">
+                <a:latin typeface="Calibri (Body)"/>
+              </a:rPr>
+              <a:t>, ta </a:t>
+            </a:r>
+            <a:r>
+              <a:rPr lang="en-US" sz="2400" dirty="0" err="1">
+                <a:latin typeface="Calibri (Body)"/>
+              </a:rPr>
+              <a:t>gửi</a:t>
+            </a:r>
+            <a:r>
+              <a:rPr lang="en-US" sz="2400" dirty="0">
+                <a:latin typeface="Calibri (Body)"/>
+              </a:rPr>
+              <a:t> </a:t>
+            </a:r>
+            <a:r>
+              <a:rPr lang="en-US" sz="2400" dirty="0" err="1">
+                <a:latin typeface="Calibri (Body)"/>
+              </a:rPr>
+              <a:t>các</a:t>
+            </a:r>
+            <a:r>
+              <a:rPr lang="en-US" sz="2400" dirty="0">
+                <a:latin typeface="Calibri (Body)"/>
+              </a:rPr>
+              <a:t> </a:t>
+            </a:r>
+            <a:r>
+              <a:rPr lang="en-US" sz="2400" dirty="0" err="1">
+                <a:latin typeface="Calibri (Body)"/>
+              </a:rPr>
+              <a:t>gói</a:t>
+            </a:r>
+            <a:r>
+              <a:rPr lang="en-US" sz="2400" dirty="0">
+                <a:latin typeface="Calibri (Body)"/>
+              </a:rPr>
+              <a:t> tin </a:t>
+            </a:r>
+            <a:r>
+              <a:rPr lang="en-US" sz="2400" dirty="0" err="1">
+                <a:latin typeface="Calibri (Body)"/>
+              </a:rPr>
+              <a:t>để</a:t>
+            </a:r>
+            <a:r>
+              <a:rPr lang="en-US" sz="2400" dirty="0">
+                <a:latin typeface="Calibri (Body)"/>
+              </a:rPr>
+              <a:t> </a:t>
+            </a:r>
+            <a:r>
+              <a:rPr lang="en-US" sz="2400" dirty="0" err="1">
+                <a:latin typeface="Calibri (Body)"/>
+              </a:rPr>
+              <a:t>kiểm</a:t>
+            </a:r>
+            <a:r>
+              <a:rPr lang="en-US" sz="2400" dirty="0">
+                <a:latin typeface="Calibri (Body)"/>
+              </a:rPr>
+              <a:t> </a:t>
+            </a:r>
+            <a:r>
+              <a:rPr lang="en-US" sz="2400" dirty="0" err="1">
+                <a:latin typeface="Calibri (Body)"/>
+              </a:rPr>
+              <a:t>thử</a:t>
+            </a:r>
+            <a:endParaRPr lang="en-US" sz="2400" dirty="0">
+              <a:latin typeface="Calibri (Body)"/>
+            </a:endParaRPr>
+          </a:p>
+          <a:p>
+            <a:pPr marL="201168" lvl="1" indent="0">
+              <a:buNone/>
+            </a:pPr>
+            <a:r>
+              <a:rPr lang="en-US" sz="2400" dirty="0">
+                <a:latin typeface="Calibri (Body)"/>
+              </a:rPr>
+              <a:t>=&gt; </a:t>
+            </a:r>
+            <a:r>
+              <a:rPr lang="en-US" sz="2400" dirty="0" err="1">
+                <a:latin typeface="Calibri (Body)"/>
+              </a:rPr>
+              <a:t>Các</a:t>
+            </a:r>
+            <a:r>
+              <a:rPr lang="en-US" sz="2400" dirty="0">
+                <a:latin typeface="Calibri (Body)"/>
+              </a:rPr>
+              <a:t> response </a:t>
+            </a:r>
+            <a:r>
+              <a:rPr lang="en-US" sz="2400" dirty="0" err="1">
+                <a:latin typeface="Calibri (Body)"/>
+              </a:rPr>
+              <a:t>từ</a:t>
+            </a:r>
+            <a:r>
+              <a:rPr lang="en-US" sz="2400" dirty="0">
+                <a:latin typeface="Calibri (Body)"/>
+              </a:rPr>
+              <a:t> server </a:t>
+            </a:r>
+            <a:r>
+              <a:rPr lang="en-US" sz="2400" dirty="0" err="1">
+                <a:latin typeface="Calibri (Body)"/>
+              </a:rPr>
+              <a:t>đều</a:t>
+            </a:r>
+            <a:r>
+              <a:rPr lang="en-US" sz="2400" dirty="0">
+                <a:latin typeface="Calibri (Body)"/>
+              </a:rPr>
+              <a:t> </a:t>
+            </a:r>
+            <a:r>
+              <a:rPr lang="en-US" sz="2400" dirty="0" err="1">
+                <a:latin typeface="Calibri (Body)"/>
+              </a:rPr>
+              <a:t>là</a:t>
+            </a:r>
+            <a:r>
+              <a:rPr lang="en-US" sz="2400" dirty="0">
+                <a:latin typeface="Calibri (Body)"/>
+              </a:rPr>
+              <a:t> OK </a:t>
+            </a:r>
+            <a:r>
+              <a:rPr lang="en-US" sz="2400" dirty="0" err="1">
+                <a:latin typeface="Calibri (Body)"/>
+              </a:rPr>
+              <a:t>và</a:t>
+            </a:r>
+            <a:r>
+              <a:rPr lang="en-US" sz="2400" dirty="0">
+                <a:latin typeface="Calibri (Body)"/>
+              </a:rPr>
+              <a:t> </a:t>
+            </a:r>
+            <a:r>
+              <a:rPr lang="en-US" sz="2400" dirty="0" err="1">
+                <a:latin typeface="Calibri (Body)"/>
+              </a:rPr>
+              <a:t>có</a:t>
+            </a:r>
+            <a:r>
+              <a:rPr lang="en-US" sz="2400" dirty="0">
+                <a:latin typeface="Calibri (Body)"/>
+              </a:rPr>
+              <a:t> </a:t>
+            </a:r>
+            <a:r>
+              <a:rPr lang="en-US" sz="2400" dirty="0" err="1">
+                <a:latin typeface="Calibri (Body)"/>
+              </a:rPr>
+              <a:t>thời</a:t>
+            </a:r>
+            <a:r>
+              <a:rPr lang="en-US" sz="2400" dirty="0">
+                <a:latin typeface="Calibri (Body)"/>
+              </a:rPr>
+              <a:t> </a:t>
+            </a:r>
+            <a:r>
+              <a:rPr lang="en-US" sz="2400" dirty="0" err="1">
+                <a:latin typeface="Calibri (Body)"/>
+              </a:rPr>
+              <a:t>gian</a:t>
+            </a:r>
+            <a:r>
+              <a:rPr lang="en-US" sz="2400" dirty="0">
+                <a:latin typeface="Calibri (Body)"/>
+              </a:rPr>
+              <a:t> </a:t>
+            </a:r>
+            <a:r>
+              <a:rPr lang="en-US" sz="2400" dirty="0" err="1">
+                <a:latin typeface="Calibri (Body)"/>
+              </a:rPr>
+              <a:t>trả</a:t>
+            </a:r>
+            <a:r>
+              <a:rPr lang="en-US" sz="2400" dirty="0">
+                <a:latin typeface="Calibri (Body)"/>
+              </a:rPr>
+              <a:t> </a:t>
+            </a:r>
+            <a:r>
+              <a:rPr lang="en-US" sz="2400" dirty="0" err="1">
+                <a:latin typeface="Calibri (Body)"/>
+              </a:rPr>
+              <a:t>lời</a:t>
+            </a:r>
+            <a:r>
+              <a:rPr lang="en-US" sz="2400" dirty="0">
+                <a:latin typeface="Calibri (Body)"/>
+              </a:rPr>
+              <a:t> </a:t>
+            </a:r>
+            <a:r>
+              <a:rPr lang="en-US" sz="2400" dirty="0" err="1">
+                <a:latin typeface="Calibri (Body)"/>
+              </a:rPr>
+              <a:t>gần</a:t>
+            </a:r>
+            <a:r>
+              <a:rPr lang="en-US" sz="2400" dirty="0">
+                <a:latin typeface="Calibri (Body)"/>
+              </a:rPr>
+              <a:t> </a:t>
+            </a:r>
+            <a:r>
+              <a:rPr lang="en-US" sz="2400" dirty="0" err="1">
+                <a:latin typeface="Calibri (Body)"/>
+              </a:rPr>
+              <a:t>nhau</a:t>
+            </a:r>
+            <a:endParaRPr lang="en-US" sz="2400" dirty="0">
+              <a:latin typeface="Calibri (Body)"/>
+            </a:endParaRPr>
+          </a:p>
+        </p:txBody>
+      </p:sp>
+      <p:pic>
+        <p:nvPicPr>
+          <p:cNvPr id="5" name="Picture 4">
+            <a:extLst>
+              <a:ext uri="{FF2B5EF4-FFF2-40B4-BE49-F238E27FC236}">
+                <a16:creationId xmlns:a16="http://schemas.microsoft.com/office/drawing/2014/main" id="{FCA4CBC2-8ECE-729F-847D-534F99875A57}"/>
+              </a:ext>
+            </a:extLst>
+          </p:cNvPr>
+          <p:cNvPicPr>
+            <a:picLocks noChangeAspect="1"/>
+          </p:cNvPicPr>
+          <p:nvPr/>
+        </p:nvPicPr>
+        <p:blipFill>
+          <a:blip r:embed="rId2"/>
+          <a:stretch>
+            <a:fillRect/>
+          </a:stretch>
+        </p:blipFill>
+        <p:spPr>
+          <a:xfrm>
+            <a:off x="5820889" y="2046628"/>
+            <a:ext cx="5915851" cy="2419688"/>
+          </a:xfrm>
+          <a:prstGeom prst="rect">
+            <a:avLst/>
+          </a:prstGeom>
+        </p:spPr>
+      </p:pic>
+    </p:spTree>
+    <p:extLst>
+      <p:ext uri="{BB962C8B-B14F-4D97-AF65-F5344CB8AC3E}">
+        <p14:creationId xmlns:p14="http://schemas.microsoft.com/office/powerpoint/2010/main" val="2345255331"/>
+      </p:ext>
+    </p:extLst>
+  </p:cSld>
+  <p:clrMapOvr>
+    <a:masterClrMapping/>
+  </p:clrMapOvr>
+</p:sld>
+</file>
+
+<file path=ppt/slides/slide13.xml><?xml version="1.0" encoding="utf-8"?>
+<p:sld xmlns:a="http://schemas.openxmlformats.org/drawingml/2006/main" xmlns:r="http://schemas.openxmlformats.org/officeDocument/2006/relationships" xmlns:p="http://schemas.openxmlformats.org/presentationml/2006/main">
+  <p:cSld>
+    <p:spTree>
+      <p:nvGrpSpPr>
+        <p:cNvPr id="1" name=""/>
+        <p:cNvGrpSpPr/>
+        <p:nvPr/>
+      </p:nvGrpSpPr>
+      <p:grpSpPr>
+        <a:xfrm>
+          <a:off x="0" y="0"/>
+          <a:ext cx="0" cy="0"/>
+          <a:chOff x="0" y="0"/>
+          <a:chExt cx="0" cy="0"/>
+        </a:xfrm>
+      </p:grpSpPr>
+      <p:sp>
+        <p:nvSpPr>
+          <p:cNvPr id="2" name="Title 1">
+            <a:extLst>
+              <a:ext uri="{FF2B5EF4-FFF2-40B4-BE49-F238E27FC236}">
+                <a16:creationId xmlns:a16="http://schemas.microsoft.com/office/drawing/2014/main" id="{512B0150-081F-3211-A95E-E15A98B8D537}"/>
+              </a:ext>
+            </a:extLst>
+          </p:cNvPr>
+          <p:cNvSpPr>
+            <a:spLocks noGrp="1"/>
+          </p:cNvSpPr>
+          <p:nvPr>
+            <p:ph type="title"/>
+          </p:nvPr>
+        </p:nvSpPr>
+        <p:spPr>
+          <a:xfrm>
+            <a:off x="0" y="263527"/>
+            <a:ext cx="10058400" cy="1450757"/>
+          </a:xfrm>
+        </p:spPr>
+        <p:txBody>
+          <a:bodyPr/>
+          <a:lstStyle/>
+          <a:p>
+            <a:r>
+              <a:rPr lang="en-US" dirty="0" err="1"/>
+              <a:t>Kết</a:t>
+            </a:r>
+            <a:r>
+              <a:rPr lang="en-US" dirty="0"/>
+              <a:t> </a:t>
+            </a:r>
+            <a:r>
+              <a:rPr lang="en-US" dirty="0" err="1"/>
+              <a:t>quả</a:t>
+            </a:r>
+            <a:r>
+              <a:rPr lang="en-US" dirty="0"/>
+              <a:t> - Attack C</a:t>
+            </a:r>
+          </a:p>
+        </p:txBody>
+      </p:sp>
+      <p:pic>
+        <p:nvPicPr>
+          <p:cNvPr id="5" name="Content Placeholder 4">
+            <a:extLst>
+              <a:ext uri="{FF2B5EF4-FFF2-40B4-BE49-F238E27FC236}">
+                <a16:creationId xmlns:a16="http://schemas.microsoft.com/office/drawing/2014/main" id="{565CED2E-5034-A152-2EF1-5CE331C2DB32}"/>
+              </a:ext>
+            </a:extLst>
+          </p:cNvPr>
+          <p:cNvPicPr>
+            <a:picLocks noGrp="1" noChangeAspect="1"/>
+          </p:cNvPicPr>
+          <p:nvPr>
+            <p:ph idx="1"/>
+          </p:nvPr>
+        </p:nvPicPr>
+        <p:blipFill>
+          <a:blip r:embed="rId2"/>
+          <a:stretch>
+            <a:fillRect/>
+          </a:stretch>
+        </p:blipFill>
+        <p:spPr>
+          <a:xfrm>
+            <a:off x="3804777" y="1855703"/>
+            <a:ext cx="8387223" cy="4024313"/>
+          </a:xfrm>
+        </p:spPr>
+      </p:pic>
+      <p:sp>
+        <p:nvSpPr>
+          <p:cNvPr id="6" name="Content Placeholder 2">
+            <a:extLst>
+              <a:ext uri="{FF2B5EF4-FFF2-40B4-BE49-F238E27FC236}">
+                <a16:creationId xmlns:a16="http://schemas.microsoft.com/office/drawing/2014/main" id="{9BA28423-2208-1782-0F63-59F4812F628A}"/>
+              </a:ext>
+            </a:extLst>
+          </p:cNvPr>
+          <p:cNvSpPr txBox="1">
+            <a:spLocks/>
+          </p:cNvSpPr>
+          <p:nvPr/>
+        </p:nvSpPr>
+        <p:spPr>
+          <a:xfrm>
+            <a:off x="0" y="1940625"/>
+            <a:ext cx="3663616" cy="4023360"/>
+          </a:xfrm>
+          <a:prstGeom prst="rect">
+            <a:avLst/>
+          </a:prstGeom>
+        </p:spPr>
+        <p:txBody>
+          <a:bodyPr vert="horz" lIns="0" tIns="45720" rIns="0" bIns="45720" rtlCol="0">
+            <a:normAutofit/>
+          </a:bodyPr>
+          <a:lstStyle>
+            <a:lvl1pPr marL="91440" indent="-91440" algn="l" defTabSz="914400" rtl="0" eaLnBrk="1" latinLnBrk="0" hangingPunct="1">
+              <a:lnSpc>
+                <a:spcPct val="90000"/>
+              </a:lnSpc>
+              <a:spcBef>
+                <a:spcPts val="1200"/>
+              </a:spcBef>
+              <a:spcAft>
+                <a:spcPts val="200"/>
+              </a:spcAft>
+              <a:buClr>
+                <a:schemeClr val="accent1"/>
+              </a:buClr>
+              <a:buSzPct val="100000"/>
+              <a:buFont typeface="Calibri" panose="020F0502020204030204" pitchFamily="34" charset="0"/>
+              <a:buChar char=" "/>
+              <a:defRPr sz="2000" kern="1200">
+                <a:solidFill>
+                  <a:schemeClr val="tx1">
+                    <a:lumMod val="75000"/>
+                    <a:lumOff val="25000"/>
+                  </a:schemeClr>
+                </a:solidFill>
+                <a:latin typeface="+mn-lt"/>
+                <a:ea typeface="+mn-ea"/>
+                <a:cs typeface="+mn-cs"/>
+              </a:defRPr>
+            </a:lvl1pPr>
+            <a:lvl2pPr marL="384048" indent="-182880" algn="l" defTabSz="914400" rtl="0" eaLnBrk="1" latinLnBrk="0" hangingPunct="1">
+              <a:lnSpc>
+                <a:spcPct val="90000"/>
+              </a:lnSpc>
+              <a:spcBef>
+                <a:spcPts val="200"/>
+              </a:spcBef>
+              <a:spcAft>
+                <a:spcPts val="400"/>
+              </a:spcAft>
+              <a:buClr>
+                <a:schemeClr val="accent1"/>
+              </a:buClr>
+              <a:buFont typeface="Calibri" pitchFamily="34" charset="0"/>
+              <a:buChar char="◦"/>
+              <a:defRPr sz="1800" kern="1200">
+                <a:solidFill>
+                  <a:schemeClr val="tx1">
+                    <a:lumMod val="75000"/>
+                    <a:lumOff val="25000"/>
+                  </a:schemeClr>
+                </a:solidFill>
+                <a:latin typeface="+mn-lt"/>
+                <a:ea typeface="+mn-ea"/>
+                <a:cs typeface="+mn-cs"/>
+              </a:defRPr>
+            </a:lvl2pPr>
+            <a:lvl3pPr marL="566928" indent="-182880" algn="l" defTabSz="914400" rtl="0" eaLnBrk="1" latinLnBrk="0" hangingPunct="1">
+              <a:lnSpc>
+                <a:spcPct val="90000"/>
+              </a:lnSpc>
+              <a:spcBef>
+                <a:spcPts val="200"/>
+              </a:spcBef>
+              <a:spcAft>
+                <a:spcPts val="400"/>
+              </a:spcAft>
+              <a:buClr>
+                <a:schemeClr val="accent1"/>
+              </a:buClr>
+              <a:buFont typeface="Calibri" pitchFamily="34" charset="0"/>
+              <a:buChar char="◦"/>
+              <a:defRPr sz="1400" kern="1200">
+                <a:solidFill>
+                  <a:schemeClr val="tx1">
+                    <a:lumMod val="75000"/>
+                    <a:lumOff val="25000"/>
+                  </a:schemeClr>
+                </a:solidFill>
+                <a:latin typeface="+mn-lt"/>
+                <a:ea typeface="+mn-ea"/>
+                <a:cs typeface="+mn-cs"/>
+              </a:defRPr>
+            </a:lvl3pPr>
+            <a:lvl4pPr marL="749808" indent="-182880" algn="l" defTabSz="914400" rtl="0" eaLnBrk="1" latinLnBrk="0" hangingPunct="1">
+              <a:lnSpc>
+                <a:spcPct val="90000"/>
+              </a:lnSpc>
+              <a:spcBef>
+                <a:spcPts val="200"/>
+              </a:spcBef>
+              <a:spcAft>
+                <a:spcPts val="400"/>
+              </a:spcAft>
+              <a:buClr>
+                <a:schemeClr val="accent1"/>
+              </a:buClr>
+              <a:buFont typeface="Calibri" pitchFamily="34" charset="0"/>
+              <a:buChar char="◦"/>
+              <a:defRPr sz="1400" kern="1200">
+                <a:solidFill>
+                  <a:schemeClr val="tx1">
+                    <a:lumMod val="75000"/>
+                    <a:lumOff val="25000"/>
+                  </a:schemeClr>
+                </a:solidFill>
+                <a:latin typeface="+mn-lt"/>
+                <a:ea typeface="+mn-ea"/>
+                <a:cs typeface="+mn-cs"/>
+              </a:defRPr>
+            </a:lvl4pPr>
+            <a:lvl5pPr marL="932688" indent="-182880" algn="l" defTabSz="914400" rtl="0" eaLnBrk="1" latinLnBrk="0" hangingPunct="1">
+              <a:lnSpc>
+                <a:spcPct val="90000"/>
+              </a:lnSpc>
+              <a:spcBef>
+                <a:spcPts val="200"/>
+              </a:spcBef>
+              <a:spcAft>
+                <a:spcPts val="400"/>
+              </a:spcAft>
+              <a:buClr>
+                <a:schemeClr val="accent1"/>
+              </a:buClr>
+              <a:buFont typeface="Calibri" pitchFamily="34" charset="0"/>
+              <a:buChar char="◦"/>
+              <a:defRPr sz="1400" kern="1200">
+                <a:solidFill>
+                  <a:schemeClr val="tx1">
+                    <a:lumMod val="75000"/>
+                    <a:lumOff val="25000"/>
+                  </a:schemeClr>
+                </a:solidFill>
+                <a:latin typeface="+mn-lt"/>
+                <a:ea typeface="+mn-ea"/>
+                <a:cs typeface="+mn-cs"/>
+              </a:defRPr>
+            </a:lvl5pPr>
+            <a:lvl6pPr marL="1100000" indent="-228600" algn="l" defTabSz="914400" rtl="0" eaLnBrk="1" latinLnBrk="0" hangingPunct="1">
+              <a:lnSpc>
+                <a:spcPct val="90000"/>
+              </a:lnSpc>
+              <a:spcBef>
+                <a:spcPts val="200"/>
+              </a:spcBef>
+              <a:spcAft>
+                <a:spcPts val="400"/>
+              </a:spcAft>
+              <a:buClr>
+                <a:schemeClr val="accent1"/>
+              </a:buClr>
+              <a:buFont typeface="Calibri" pitchFamily="34" charset="0"/>
+              <a:buChar char="◦"/>
+              <a:defRPr sz="1400" kern="1200">
+                <a:solidFill>
+                  <a:schemeClr val="tx1">
+                    <a:lumMod val="75000"/>
+                    <a:lumOff val="25000"/>
+                  </a:schemeClr>
+                </a:solidFill>
+                <a:latin typeface="+mn-lt"/>
+                <a:ea typeface="+mn-ea"/>
+                <a:cs typeface="+mn-cs"/>
+              </a:defRPr>
+            </a:lvl6pPr>
+            <a:lvl7pPr marL="1300000" indent="-228600" algn="l" defTabSz="914400" rtl="0" eaLnBrk="1" latinLnBrk="0" hangingPunct="1">
+              <a:lnSpc>
+                <a:spcPct val="90000"/>
+              </a:lnSpc>
+              <a:spcBef>
+                <a:spcPts val="200"/>
+              </a:spcBef>
+              <a:spcAft>
+                <a:spcPts val="400"/>
+              </a:spcAft>
+              <a:buClr>
+                <a:schemeClr val="accent1"/>
+              </a:buClr>
+              <a:buFont typeface="Calibri" pitchFamily="34" charset="0"/>
+              <a:buChar char="◦"/>
+              <a:defRPr sz="1400" kern="1200">
+                <a:solidFill>
+                  <a:schemeClr val="tx1">
+                    <a:lumMod val="75000"/>
+                    <a:lumOff val="25000"/>
+                  </a:schemeClr>
+                </a:solidFill>
+                <a:latin typeface="+mn-lt"/>
+                <a:ea typeface="+mn-ea"/>
+                <a:cs typeface="+mn-cs"/>
+              </a:defRPr>
+            </a:lvl7pPr>
+            <a:lvl8pPr marL="1500000" indent="-228600" algn="l" defTabSz="914400" rtl="0" eaLnBrk="1" latinLnBrk="0" hangingPunct="1">
+              <a:lnSpc>
+                <a:spcPct val="90000"/>
+              </a:lnSpc>
+              <a:spcBef>
+                <a:spcPts val="200"/>
+              </a:spcBef>
+              <a:spcAft>
+                <a:spcPts val="400"/>
+              </a:spcAft>
+              <a:buClr>
+                <a:schemeClr val="accent1"/>
+              </a:buClr>
+              <a:buFont typeface="Calibri" pitchFamily="34" charset="0"/>
+              <a:buChar char="◦"/>
+              <a:defRPr sz="1400" kern="1200">
+                <a:solidFill>
+                  <a:schemeClr val="tx1">
+                    <a:lumMod val="75000"/>
+                    <a:lumOff val="25000"/>
+                  </a:schemeClr>
+                </a:solidFill>
+                <a:latin typeface="+mn-lt"/>
+                <a:ea typeface="+mn-ea"/>
+                <a:cs typeface="+mn-cs"/>
+              </a:defRPr>
+            </a:lvl8pPr>
+            <a:lvl9pPr marL="1700000" indent="-228600" algn="l" defTabSz="914400" rtl="0" eaLnBrk="1" latinLnBrk="0" hangingPunct="1">
+              <a:lnSpc>
+                <a:spcPct val="90000"/>
+              </a:lnSpc>
+              <a:spcBef>
+                <a:spcPts val="200"/>
+              </a:spcBef>
+              <a:spcAft>
+                <a:spcPts val="400"/>
+              </a:spcAft>
+              <a:buClr>
+                <a:schemeClr val="accent1"/>
+              </a:buClr>
+              <a:buFont typeface="Calibri" pitchFamily="34" charset="0"/>
+              <a:buChar char="◦"/>
+              <a:defRPr sz="1400" kern="1200">
+                <a:solidFill>
+                  <a:schemeClr val="tx1">
+                    <a:lumMod val="75000"/>
+                    <a:lumOff val="25000"/>
+                  </a:schemeClr>
+                </a:solidFill>
+                <a:latin typeface="+mn-lt"/>
+                <a:ea typeface="+mn-ea"/>
+                <a:cs typeface="+mn-cs"/>
+              </a:defRPr>
+            </a:lvl9pPr>
+          </a:lstStyle>
+          <a:p>
+            <a:pPr marL="201168" lvl="1" indent="0">
+              <a:buNone/>
+            </a:pPr>
+            <a:r>
+              <a:rPr lang="en-US" sz="2400" dirty="0">
+                <a:latin typeface="Calibri (Body)"/>
+              </a:rPr>
+              <a:t>=&gt; </a:t>
+            </a:r>
+            <a:r>
+              <a:rPr lang="en-US" sz="2400" dirty="0" err="1">
+                <a:latin typeface="Calibri (Body)"/>
+              </a:rPr>
+              <a:t>Tốn</a:t>
+            </a:r>
+            <a:r>
+              <a:rPr lang="en-US" sz="2400" dirty="0">
+                <a:latin typeface="Calibri (Body)"/>
+              </a:rPr>
+              <a:t> </a:t>
+            </a:r>
+            <a:r>
+              <a:rPr lang="en-US" sz="2400" dirty="0" err="1">
+                <a:latin typeface="Calibri (Body)"/>
+              </a:rPr>
+              <a:t>khoảng</a:t>
+            </a:r>
+            <a:r>
+              <a:rPr lang="en-US" sz="2400" dirty="0">
+                <a:latin typeface="Calibri (Body)"/>
+              </a:rPr>
+              <a:t> 0.02s </a:t>
+            </a:r>
+            <a:r>
+              <a:rPr lang="en-US" sz="2400" dirty="0" err="1">
+                <a:latin typeface="Calibri (Body)"/>
+              </a:rPr>
+              <a:t>để</a:t>
+            </a:r>
+            <a:r>
+              <a:rPr lang="en-US" sz="2400" dirty="0">
+                <a:latin typeface="Calibri (Body)"/>
+              </a:rPr>
+              <a:t> attack </a:t>
+            </a:r>
+            <a:r>
+              <a:rPr lang="en-US" sz="2400" dirty="0" err="1">
+                <a:latin typeface="Calibri (Body)"/>
+              </a:rPr>
+              <a:t>thành</a:t>
+            </a:r>
+            <a:r>
+              <a:rPr lang="en-US" sz="2400" dirty="0">
+                <a:latin typeface="Calibri (Body)"/>
+              </a:rPr>
+              <a:t> </a:t>
+            </a:r>
+            <a:r>
+              <a:rPr lang="en-US" sz="2400" dirty="0" err="1">
+                <a:latin typeface="Calibri (Body)"/>
+              </a:rPr>
+              <a:t>công</a:t>
+            </a:r>
+            <a:endParaRPr lang="en-US" sz="2400" dirty="0">
+              <a:latin typeface="Calibri (Body)"/>
+            </a:endParaRPr>
+          </a:p>
+        </p:txBody>
+      </p:sp>
+    </p:spTree>
+    <p:extLst>
+      <p:ext uri="{BB962C8B-B14F-4D97-AF65-F5344CB8AC3E}">
+        <p14:creationId xmlns:p14="http://schemas.microsoft.com/office/powerpoint/2010/main" val="1552816970"/>
+      </p:ext>
+    </p:extLst>
+  </p:cSld>
+  <p:clrMapOvr>
+    <a:masterClrMapping/>
+  </p:clrMapOvr>
+</p:sld>
+</file>
+
+<file path=ppt/slides/slide14.xml><?xml version="1.0" encoding="utf-8"?>
 <p:sld xmlns:a="http://schemas.openxmlformats.org/drawingml/2006/main" xmlns:r="http://schemas.openxmlformats.org/officeDocument/2006/relationships" xmlns:p="http://schemas.openxmlformats.org/presentationml/2006/main">
   <p:cSld>
     <p:spTree>
@@ -4226,7 +7244,7 @@
 </p:sld>
 </file>
 
-<file path=ppt/slides/slide12.xml><?xml version="1.0" encoding="utf-8"?>
+<file path=ppt/slides/slide15.xml><?xml version="1.0" encoding="utf-8"?>
 <p:sld xmlns:a="http://schemas.openxmlformats.org/drawingml/2006/main" xmlns:r="http://schemas.openxmlformats.org/officeDocument/2006/relationships" xmlns:p="http://schemas.openxmlformats.org/presentationml/2006/main">
   <p:cSld>
     <p:spTree>
@@ -4968,7 +7986,7 @@
 </p:sld>
 </file>
 
-<file path=ppt/slides/slide13.xml><?xml version="1.0" encoding="utf-8"?>
+<file path=ppt/slides/slide16.xml><?xml version="1.0" encoding="utf-8"?>
 <p:sld xmlns:a="http://schemas.openxmlformats.org/drawingml/2006/main" xmlns:r="http://schemas.openxmlformats.org/officeDocument/2006/relationships" xmlns:p="http://schemas.openxmlformats.org/presentationml/2006/main">
   <p:cSld>
     <p:spTree>
@@ -5055,7 +8073,74 @@
           <a:p>
             <a:r>
               <a:rPr lang="en-US" dirty="0"/>
-              <a:t>//</a:t>
+              <a:t>- RSA </a:t>
+            </a:r>
+            <a:r>
+              <a:rPr lang="en-US" dirty="0" err="1"/>
+              <a:t>vẫn</a:t>
+            </a:r>
+            <a:r>
+              <a:rPr lang="en-US" dirty="0"/>
+              <a:t> an </a:t>
+            </a:r>
+            <a:r>
+              <a:rPr lang="en-US" dirty="0" err="1"/>
+              <a:t>toàn</a:t>
+            </a:r>
+            <a:r>
+              <a:rPr lang="en-US" dirty="0"/>
+              <a:t> </a:t>
+            </a:r>
+            <a:r>
+              <a:rPr lang="en-US" dirty="0" err="1"/>
+              <a:t>nếu</a:t>
+            </a:r>
+            <a:r>
+              <a:rPr lang="en-US" dirty="0"/>
+              <a:t> </a:t>
+            </a:r>
+            <a:r>
+              <a:rPr lang="en-US" dirty="0" err="1"/>
+              <a:t>triển</a:t>
+            </a:r>
+            <a:r>
+              <a:rPr lang="en-US" dirty="0"/>
+              <a:t> </a:t>
+            </a:r>
+            <a:r>
+              <a:rPr lang="en-US" dirty="0" err="1"/>
+              <a:t>khai</a:t>
+            </a:r>
+            <a:r>
+              <a:rPr lang="en-US" dirty="0"/>
+              <a:t> </a:t>
+            </a:r>
+            <a:r>
+              <a:rPr lang="en-US" dirty="0" err="1"/>
+              <a:t>chuẩn</a:t>
+            </a:r>
+            <a:r>
+              <a:rPr lang="en-US" dirty="0"/>
+              <a:t>, </a:t>
+            </a:r>
+            <a:r>
+              <a:rPr lang="en-US" dirty="0" err="1"/>
+              <a:t>đầy</a:t>
+            </a:r>
+            <a:r>
+              <a:rPr lang="en-US" dirty="0"/>
+              <a:t> </a:t>
+            </a:r>
+            <a:r>
+              <a:rPr lang="en-US" dirty="0" err="1"/>
+              <a:t>đủ</a:t>
+            </a:r>
+            <a:endParaRPr lang="en-US" dirty="0"/>
+          </a:p>
+          <a:p>
+            <a:r>
+              <a:rPr lang="en-US" dirty="0"/>
+              <a:t>- </a:t>
             </a:r>
           </a:p>
         </p:txBody>
@@ -8111,15 +11196,7 @@
             </a:r>
             <a:r>
               <a:rPr lang="en-US" sz="2800" dirty="0"/>
-              <a:t> session se </a:t>
-            </a:r>
-            <a:r>
-              <a:rPr lang="en-US" sz="2800" dirty="0" err="1"/>
-              <a:t>cret</a:t>
-            </a:r>
-            <a:r>
-              <a:rPr lang="en-US" sz="2800" dirty="0"/>
-              <a:t>; </a:t>
+              <a:t> session secret; </a:t>
             </a:r>
             <a:r>
               <a:rPr lang="en-US" sz="2800" dirty="0" err="1"/>
@@ -8641,21 +11718,6 @@
 </file>
 
 <file path=customXml/item1.xml><?xml version="1.0" encoding="utf-8"?>
-<p:properties xmlns:p="http://schemas.microsoft.com/office/2006/metadata/properties" xmlns:xsi="http://www.w3.org/2001/XMLSchema-instance" xmlns:pc="http://schemas.microsoft.com/office/infopath/2007/PartnerControls">
-  <documentManagement/>
-</p:properties>
-</file>
-
-<file path=customXml/item2.xml><?xml version="1.0" encoding="utf-8"?>
-<?mso-contentType ?>
-<FormTemplates xmlns="http://schemas.microsoft.com/sharepoint/v3/contenttype/forms">
-  <Display>DocumentLibraryForm</Display>
-  <Edit>DocumentLibraryForm</Edit>
-  <New>DocumentLibraryForm</New>
-</FormTemplates>
-</file>
-
-<file path=customXml/item3.xml><?xml version="1.0" encoding="utf-8"?>
 <ct:contentTypeSchema xmlns:ct="http://schemas.microsoft.com/office/2006/metadata/contentType" xmlns:ma="http://schemas.microsoft.com/office/2006/metadata/properties/metaAttributes" ct:_="" ma:_="" ma:contentTypeName="Tài liệu" ma:contentTypeID="0x010100B1C9C9CFBA54554FAB72A368ED558EE9" ma:contentTypeVersion="4" ma:contentTypeDescription="Tạo tài liệu mới." ma:contentTypeScope="" ma:versionID="7afe8246de33ba856f7f9004637ff618">
   <xsd:schema xmlns:xsd="http://www.w3.org/2001/XMLSchema" xmlns:xs="http://www.w3.org/2001/XMLSchema" xmlns:p="http://schemas.microsoft.com/office/2006/metadata/properties" xmlns:ns3="7804a6fb-3003-4c78-85cc-87186ae6e246" targetNamespace="http://schemas.microsoft.com/office/2006/metadata/properties" ma:root="true" ma:fieldsID="1dbbbb438070c4d288d95d0c153f475e" ns3:_="">
     <xsd:import namespace="7804a6fb-3003-4c78-85cc-87186ae6e246"/>
@@ -8799,31 +11861,22 @@
 </ct:contentTypeSchema>
 </file>
 
-<file path=customXml/itemProps1.xml><?xml version="1.0" encoding="utf-8"?>
-<ds:datastoreItem xmlns:ds="http://schemas.openxmlformats.org/officeDocument/2006/customXml" ds:itemID="{9EA5A663-36CB-4D52-ACF0-0994F2B58167}">
-  <ds:schemaRefs>
-    <ds:schemaRef ds:uri="http://purl.org/dc/dcmitype/"/>
-    <ds:schemaRef ds:uri="http://schemas.openxmlformats.org/package/2006/metadata/core-properties"/>
-    <ds:schemaRef ds:uri="http://purl.org/dc/elements/1.1/"/>
-    <ds:schemaRef ds:uri="http://purl.org/dc/terms/"/>
-    <ds:schemaRef ds:uri="http://www.w3.org/XML/1998/namespace"/>
-    <ds:schemaRef ds:uri="http://schemas.microsoft.com/office/2006/documentManagement/types"/>
-    <ds:schemaRef ds:uri="http://schemas.microsoft.com/office/infopath/2007/PartnerControls"/>
-    <ds:schemaRef ds:uri="7804a6fb-3003-4c78-85cc-87186ae6e246"/>
-    <ds:schemaRef ds:uri="http://schemas.microsoft.com/office/2006/metadata/properties"/>
-  </ds:schemaRefs>
-</ds:datastoreItem>
+<file path=customXml/item2.xml><?xml version="1.0" encoding="utf-8"?>
+<?mso-contentType ?>
+<FormTemplates xmlns="http://schemas.microsoft.com/sharepoint/v3/contenttype/forms">
+  <Display>DocumentLibraryForm</Display>
+  <Edit>DocumentLibraryForm</Edit>
+  <New>DocumentLibraryForm</New>
+</FormTemplates>
 </file>
 
-<file path=customXml/itemProps2.xml><?xml version="1.0" encoding="utf-8"?>
-<ds:datastoreItem xmlns:ds="http://schemas.openxmlformats.org/officeDocument/2006/customXml" ds:itemID="{02A294DC-FDDB-4C19-A732-9D70B934EFDB}">
-  <ds:schemaRefs>
-    <ds:schemaRef ds:uri="http://schemas.microsoft.com/sharepoint/v3/contenttype/forms"/>
-  </ds:schemaRefs>
-</ds:datastoreItem>
+<file path=customXml/item3.xml><?xml version="1.0" encoding="utf-8"?>
+<p:properties xmlns:p="http://schemas.microsoft.com/office/2006/metadata/properties" xmlns:xsi="http://www.w3.org/2001/XMLSchema-instance" xmlns:pc="http://schemas.microsoft.com/office/infopath/2007/PartnerControls">
+  <documentManagement/>
+</p:properties>
 </file>
 
-<file path=customXml/itemProps3.xml><?xml version="1.0" encoding="utf-8"?>
+<file path=customXml/itemProps1.xml><?xml version="1.0" encoding="utf-8"?>
 <ds:datastoreItem xmlns:ds="http://schemas.openxmlformats.org/officeDocument/2006/customXml" ds:itemID="{FDB0FCB8-DB46-4959-B9E6-F720DF2AB4B9}">
   <ds:schemaRefs>
     <ds:schemaRef ds:uri="http://schemas.microsoft.com/office/2006/metadata/contentType"/>
@@ -8839,4 +11892,28 @@
     <ds:schemaRef ds:uri="http://schemas.microsoft.com/internal/obd"/>
   </ds:schemaRefs>
 </ds:datastoreItem>
+</file>
+
+<file path=customXml/itemProps2.xml><?xml version="1.0" encoding="utf-8"?>
+<ds:datastoreItem xmlns:ds="http://schemas.openxmlformats.org/officeDocument/2006/customXml" ds:itemID="{02A294DC-FDDB-4C19-A732-9D70B934EFDB}">
+  <ds:schemaRefs>
+    <ds:schemaRef ds:uri="http://schemas.microsoft.com/sharepoint/v3/contenttype/forms"/>
+  </ds:schemaRefs>
+</ds:datastoreItem>
+</file>
+
+<file path=customXml/itemProps3.xml><?xml version="1.0" encoding="utf-8"?>
+<ds:datastoreItem xmlns:ds="http://schemas.openxmlformats.org/officeDocument/2006/customXml" ds:itemID="{9EA5A663-36CB-4D52-ACF0-0994F2B58167}">
+  <ds:schemaRefs>
+    <ds:schemaRef ds:uri="http://purl.org/dc/dcmitype/"/>
+    <ds:schemaRef ds:uri="http://schemas.openxmlformats.org/package/2006/metadata/core-properties"/>
+    <ds:schemaRef ds:uri="http://purl.org/dc/elements/1.1/"/>
+    <ds:schemaRef ds:uri="http://purl.org/dc/terms/"/>
+    <ds:schemaRef ds:uri="http://www.w3.org/XML/1998/namespace"/>
+    <ds:schemaRef ds:uri="http://schemas.microsoft.com/office/2006/documentManagement/types"/>
+    <ds:schemaRef ds:uri="http://schemas.microsoft.com/office/infopath/2007/PartnerControls"/>
+    <ds:schemaRef ds:uri="7804a6fb-3003-4c78-85cc-87186ae6e246"/>
+    <ds:schemaRef ds:uri="http://schemas.microsoft.com/office/2006/metadata/properties"/>
+  </ds:schemaRefs>
+</ds:datastoreItem>
 </file>
</xml_diff>